<commit_message>
Slides and materials for Hands On Training Sessions for modules 3-6
</commit_message>
<xml_diff>
--- a/Slides/4. Functional Programming/4-functional-programming-slides.pptx
+++ b/Slides/4. Functional Programming/4-functional-programming-slides.pptx
@@ -5,7 +5,7 @@
     <p:sldMasterId id="2147483648" r:id="rId1"/>
   </p:sldMasterIdLst>
   <p:notesMasterIdLst>
-    <p:notesMasterId r:id="rId10"/>
+    <p:notesMasterId r:id="rId28"/>
   </p:notesMasterIdLst>
   <p:sldIdLst>
     <p:sldId id="256" r:id="rId2"/>
@@ -16,6 +16,24 @@
     <p:sldId id="261" r:id="rId7"/>
     <p:sldId id="262" r:id="rId8"/>
     <p:sldId id="263" r:id="rId9"/>
+    <p:sldId id="264" r:id="rId10"/>
+    <p:sldId id="265" r:id="rId11"/>
+    <p:sldId id="266" r:id="rId12"/>
+    <p:sldId id="267" r:id="rId13"/>
+    <p:sldId id="268" r:id="rId14"/>
+    <p:sldId id="269" r:id="rId15"/>
+    <p:sldId id="270" r:id="rId16"/>
+    <p:sldId id="271" r:id="rId17"/>
+    <p:sldId id="272" r:id="rId18"/>
+    <p:sldId id="273" r:id="rId19"/>
+    <p:sldId id="274" r:id="rId20"/>
+    <p:sldId id="281" r:id="rId21"/>
+    <p:sldId id="275" r:id="rId22"/>
+    <p:sldId id="276" r:id="rId23"/>
+    <p:sldId id="277" r:id="rId24"/>
+    <p:sldId id="278" r:id="rId25"/>
+    <p:sldId id="279" r:id="rId26"/>
+    <p:sldId id="280" r:id="rId27"/>
   </p:sldIdLst>
   <p:sldSz cx="9144000" cy="6858000" type="screen4x3"/>
   <p:notesSz cx="6858000" cy="9144000"/>
@@ -199,7 +217,8 @@
           <a:p>
             <a:fld id="{317172C6-E830-433E-875D-8C27D49491BF}" type="datetimeFigureOut">
               <a:rPr lang="en-US" smtClean="0"/>
-              <a:t>7/24/2021</a:t>
+              <a:pPr/>
+              <a:t>7/25/2021</a:t>
             </a:fld>
             <a:endParaRPr lang="en-US"/>
           </a:p>
@@ -360,6 +379,7 @@
           <a:p>
             <a:fld id="{E5F45EB0-03CE-4E97-8470-2EFC4F3ACCE5}" type="slidenum">
               <a:rPr lang="en-US" smtClean="0"/>
+              <a:pPr/>
               <a:t>‹#›</a:t>
             </a:fld>
             <a:endParaRPr lang="en-US"/>
@@ -645,7 +665,8 @@
           <a:p>
             <a:fld id="{F601DB93-A78F-4C7D-96ED-36B8BEAC4DD2}" type="datetime1">
               <a:rPr lang="en-US" smtClean="0"/>
-              <a:t>7/24/2021</a:t>
+              <a:pPr/>
+              <a:t>7/25/2021</a:t>
             </a:fld>
             <a:endParaRPr lang="en-US"/>
           </a:p>
@@ -687,6 +708,7 @@
           <a:p>
             <a:fld id="{4006A555-BC29-4783-AB8D-804806BE464C}" type="slidenum">
               <a:rPr lang="en-US" smtClean="0"/>
+              <a:pPr/>
               <a:t>‹#›</a:t>
             </a:fld>
             <a:endParaRPr lang="en-US"/>
@@ -810,7 +832,8 @@
           <a:p>
             <a:fld id="{4ED98E0D-E25A-4E23-82D8-E5158D257DB0}" type="datetime1">
               <a:rPr lang="en-US" smtClean="0"/>
-              <a:t>7/24/2021</a:t>
+              <a:pPr/>
+              <a:t>7/25/2021</a:t>
             </a:fld>
             <a:endParaRPr lang="en-US"/>
           </a:p>
@@ -852,6 +875,7 @@
           <a:p>
             <a:fld id="{4006A555-BC29-4783-AB8D-804806BE464C}" type="slidenum">
               <a:rPr lang="en-US" smtClean="0"/>
+              <a:pPr/>
               <a:t>‹#›</a:t>
             </a:fld>
             <a:endParaRPr lang="en-US"/>
@@ -985,7 +1009,8 @@
           <a:p>
             <a:fld id="{66A2FA6E-984D-415C-BA6A-D162F4B9270B}" type="datetime1">
               <a:rPr lang="en-US" smtClean="0"/>
-              <a:t>7/24/2021</a:t>
+              <a:pPr/>
+              <a:t>7/25/2021</a:t>
             </a:fld>
             <a:endParaRPr lang="en-US"/>
           </a:p>
@@ -1027,6 +1052,7 @@
           <a:p>
             <a:fld id="{4006A555-BC29-4783-AB8D-804806BE464C}" type="slidenum">
               <a:rPr lang="en-US" smtClean="0"/>
+              <a:pPr/>
               <a:t>‹#›</a:t>
             </a:fld>
             <a:endParaRPr lang="en-US"/>
@@ -1150,7 +1176,8 @@
           <a:p>
             <a:fld id="{3D73B9A7-1DAA-4BAD-BD9C-48FB8E2FAE18}" type="datetime1">
               <a:rPr lang="en-US" smtClean="0"/>
-              <a:t>7/24/2021</a:t>
+              <a:pPr/>
+              <a:t>7/25/2021</a:t>
             </a:fld>
             <a:endParaRPr lang="en-US"/>
           </a:p>
@@ -1192,6 +1219,7 @@
           <a:p>
             <a:fld id="{4006A555-BC29-4783-AB8D-804806BE464C}" type="slidenum">
               <a:rPr lang="en-US" smtClean="0"/>
+              <a:pPr/>
               <a:t>‹#›</a:t>
             </a:fld>
             <a:endParaRPr lang="en-US"/>
@@ -1391,7 +1419,8 @@
           <a:p>
             <a:fld id="{55D4FED5-25E3-4BF6-9DFC-2820B45F8DE4}" type="datetime1">
               <a:rPr lang="en-US" smtClean="0"/>
-              <a:t>7/24/2021</a:t>
+              <a:pPr/>
+              <a:t>7/25/2021</a:t>
             </a:fld>
             <a:endParaRPr lang="en-US"/>
           </a:p>
@@ -1433,6 +1462,7 @@
           <a:p>
             <a:fld id="{4006A555-BC29-4783-AB8D-804806BE464C}" type="slidenum">
               <a:rPr lang="en-US" smtClean="0"/>
+              <a:pPr/>
               <a:t>‹#›</a:t>
             </a:fld>
             <a:endParaRPr lang="en-US"/>
@@ -1674,7 +1704,8 @@
           <a:p>
             <a:fld id="{EFFCE610-3997-4D6A-BA53-41620075A91D}" type="datetime1">
               <a:rPr lang="en-US" smtClean="0"/>
-              <a:t>7/24/2021</a:t>
+              <a:pPr/>
+              <a:t>7/25/2021</a:t>
             </a:fld>
             <a:endParaRPr lang="en-US"/>
           </a:p>
@@ -1716,6 +1747,7 @@
           <a:p>
             <a:fld id="{4006A555-BC29-4783-AB8D-804806BE464C}" type="slidenum">
               <a:rPr lang="en-US" smtClean="0"/>
+              <a:pPr/>
               <a:t>‹#›</a:t>
             </a:fld>
             <a:endParaRPr lang="en-US"/>
@@ -2091,7 +2123,8 @@
           <a:p>
             <a:fld id="{6263BC6A-1FB2-4ADE-AD8E-17A1271BB191}" type="datetime1">
               <a:rPr lang="en-US" smtClean="0"/>
-              <a:t>7/24/2021</a:t>
+              <a:pPr/>
+              <a:t>7/25/2021</a:t>
             </a:fld>
             <a:endParaRPr lang="en-US"/>
           </a:p>
@@ -2133,6 +2166,7 @@
           <a:p>
             <a:fld id="{4006A555-BC29-4783-AB8D-804806BE464C}" type="slidenum">
               <a:rPr lang="en-US" smtClean="0"/>
+              <a:pPr/>
               <a:t>‹#›</a:t>
             </a:fld>
             <a:endParaRPr lang="en-US"/>
@@ -2204,7 +2238,8 @@
           <a:p>
             <a:fld id="{8A3B4F05-9FC7-4FCA-B3D6-20CDA05C87E1}" type="datetime1">
               <a:rPr lang="en-US" smtClean="0"/>
-              <a:t>7/24/2021</a:t>
+              <a:pPr/>
+              <a:t>7/25/2021</a:t>
             </a:fld>
             <a:endParaRPr lang="en-US"/>
           </a:p>
@@ -2246,6 +2281,7 @@
           <a:p>
             <a:fld id="{4006A555-BC29-4783-AB8D-804806BE464C}" type="slidenum">
               <a:rPr lang="en-US" smtClean="0"/>
+              <a:pPr/>
               <a:t>‹#›</a:t>
             </a:fld>
             <a:endParaRPr lang="en-US"/>
@@ -2294,7 +2330,8 @@
           <a:p>
             <a:fld id="{1A8CB303-6761-46FD-AB2E-1750367E3906}" type="datetime1">
               <a:rPr lang="en-US" smtClean="0"/>
-              <a:t>7/24/2021</a:t>
+              <a:pPr/>
+              <a:t>7/25/2021</a:t>
             </a:fld>
             <a:endParaRPr lang="en-US"/>
           </a:p>
@@ -2336,6 +2373,7 @@
           <a:p>
             <a:fld id="{4006A555-BC29-4783-AB8D-804806BE464C}" type="slidenum">
               <a:rPr lang="en-US" smtClean="0"/>
+              <a:pPr/>
               <a:t>‹#›</a:t>
             </a:fld>
             <a:endParaRPr lang="en-US"/>
@@ -2566,7 +2604,8 @@
           <a:p>
             <a:fld id="{28530420-139E-42B5-ADD5-E5D6130CE422}" type="datetime1">
               <a:rPr lang="en-US" smtClean="0"/>
-              <a:t>7/24/2021</a:t>
+              <a:pPr/>
+              <a:t>7/25/2021</a:t>
             </a:fld>
             <a:endParaRPr lang="en-US"/>
           </a:p>
@@ -2608,6 +2647,7 @@
           <a:p>
             <a:fld id="{4006A555-BC29-4783-AB8D-804806BE464C}" type="slidenum">
               <a:rPr lang="en-US" smtClean="0"/>
+              <a:pPr/>
               <a:t>‹#›</a:t>
             </a:fld>
             <a:endParaRPr lang="en-US"/>
@@ -2814,7 +2854,8 @@
           <a:p>
             <a:fld id="{A735B747-6E9D-4C18-924F-E449E0277419}" type="datetime1">
               <a:rPr lang="en-US" smtClean="0"/>
-              <a:t>7/24/2021</a:t>
+              <a:pPr/>
+              <a:t>7/25/2021</a:t>
             </a:fld>
             <a:endParaRPr lang="en-US"/>
           </a:p>
@@ -2856,6 +2897,7 @@
           <a:p>
             <a:fld id="{4006A555-BC29-4783-AB8D-804806BE464C}" type="slidenum">
               <a:rPr lang="en-US" smtClean="0"/>
+              <a:pPr/>
               <a:t>‹#›</a:t>
             </a:fld>
             <a:endParaRPr lang="en-US"/>
@@ -3022,7 +3064,8 @@
           <a:p>
             <a:fld id="{381D8929-6285-4C84-9390-3EC09D6ACEB8}" type="datetime1">
               <a:rPr lang="en-US" smtClean="0"/>
-              <a:t>7/24/2021</a:t>
+              <a:pPr/>
+              <a:t>7/25/2021</a:t>
             </a:fld>
             <a:endParaRPr lang="en-US"/>
           </a:p>
@@ -3100,6 +3143,7 @@
           <a:p>
             <a:fld id="{4006A555-BC29-4783-AB8D-804806BE464C}" type="slidenum">
               <a:rPr lang="en-US" smtClean="0"/>
+              <a:pPr/>
               <a:t>‹#›</a:t>
             </a:fld>
             <a:endParaRPr lang="en-US"/>
@@ -3481,12 +3525,1295 @@
           <a:p>
             <a:fld id="{4006A555-BC29-4783-AB8D-804806BE464C}" type="slidenum">
               <a:rPr lang="en-US" smtClean="0"/>
+              <a:pPr/>
               <a:t>1</a:t>
             </a:fld>
             <a:endParaRPr lang="en-US"/>
           </a:p>
         </p:txBody>
       </p:sp>
+    </p:spTree>
+  </p:cSld>
+  <p:clrMapOvr>
+    <a:masterClrMapping/>
+  </p:clrMapOvr>
+</p:sld>
+</file>
+
+<file path=ppt/slides/slide10.xml><?xml version="1.0" encoding="utf-8"?>
+<p:sld xmlns:a="http://schemas.openxmlformats.org/drawingml/2006/main" xmlns:r="http://schemas.openxmlformats.org/officeDocument/2006/relationships" xmlns:p="http://schemas.openxmlformats.org/presentationml/2006/main">
+  <p:cSld>
+    <p:spTree>
+      <p:nvGrpSpPr>
+        <p:cNvPr id="1" name=""/>
+        <p:cNvGrpSpPr/>
+        <p:nvPr/>
+      </p:nvGrpSpPr>
+      <p:grpSpPr>
+        <a:xfrm>
+          <a:off x="0" y="0"/>
+          <a:ext cx="0" cy="0"/>
+          <a:chOff x="0" y="0"/>
+          <a:chExt cx="0" cy="0"/>
+        </a:xfrm>
+      </p:grpSpPr>
+      <p:sp>
+        <p:nvSpPr>
+          <p:cNvPr id="2" name="Title 1"/>
+          <p:cNvSpPr>
+            <a:spLocks noGrp="1"/>
+          </p:cNvSpPr>
+          <p:nvPr>
+            <p:ph type="title"/>
+          </p:nvPr>
+        </p:nvSpPr>
+        <p:spPr/>
+        <p:txBody>
+          <a:bodyPr/>
+          <a:lstStyle/>
+          <a:p>
+            <a:endParaRPr lang="en-US"/>
+          </a:p>
+        </p:txBody>
+      </p:sp>
+      <p:sp>
+        <p:nvSpPr>
+          <p:cNvPr id="3" name="Content Placeholder 2"/>
+          <p:cNvSpPr>
+            <a:spLocks noGrp="1"/>
+          </p:cNvSpPr>
+          <p:nvPr>
+            <p:ph idx="1"/>
+          </p:nvPr>
+        </p:nvSpPr>
+        <p:spPr/>
+        <p:txBody>
+          <a:bodyPr/>
+          <a:lstStyle/>
+          <a:p>
+            <a:endParaRPr lang="en-US"/>
+          </a:p>
+        </p:txBody>
+      </p:sp>
+      <p:sp>
+        <p:nvSpPr>
+          <p:cNvPr id="4" name="Slide Number Placeholder 3"/>
+          <p:cNvSpPr>
+            <a:spLocks noGrp="1"/>
+          </p:cNvSpPr>
+          <p:nvPr>
+            <p:ph type="sldNum" sz="quarter" idx="12"/>
+          </p:nvPr>
+        </p:nvSpPr>
+        <p:spPr/>
+        <p:txBody>
+          <a:bodyPr/>
+          <a:lstStyle/>
+          <a:p>
+            <a:fld id="{4006A555-BC29-4783-AB8D-804806BE464C}" type="slidenum">
+              <a:rPr lang="en-US" smtClean="0"/>
+              <a:pPr/>
+              <a:t>10</a:t>
+            </a:fld>
+            <a:endParaRPr lang="en-US"/>
+          </a:p>
+        </p:txBody>
+      </p:sp>
+      <p:pic>
+        <p:nvPicPr>
+          <p:cNvPr id="2050" name="Picture 2"/>
+          <p:cNvPicPr>
+            <a:picLocks noChangeAspect="1" noChangeArrowheads="1"/>
+          </p:cNvPicPr>
+          <p:nvPr/>
+        </p:nvPicPr>
+        <p:blipFill>
+          <a:blip r:embed="rId2"/>
+          <a:srcRect/>
+          <a:stretch>
+            <a:fillRect/>
+          </a:stretch>
+        </p:blipFill>
+        <p:spPr bwMode="auto">
+          <a:xfrm>
+            <a:off x="661988" y="919163"/>
+            <a:ext cx="7820025" cy="5019675"/>
+          </a:xfrm>
+          <a:prstGeom prst="rect">
+            <a:avLst/>
+          </a:prstGeom>
+          <a:noFill/>
+          <a:ln w="9525">
+            <a:noFill/>
+            <a:miter lim="800000"/>
+            <a:headEnd/>
+            <a:tailEnd/>
+          </a:ln>
+          <a:effectLst/>
+        </p:spPr>
+      </p:pic>
+    </p:spTree>
+  </p:cSld>
+  <p:clrMapOvr>
+    <a:masterClrMapping/>
+  </p:clrMapOvr>
+  <p:timing>
+    <p:tnLst>
+      <p:par>
+        <p:cTn id="1" dur="indefinite" restart="never" nodeType="tmRoot"/>
+      </p:par>
+    </p:tnLst>
+  </p:timing>
+</p:sld>
+</file>
+
+<file path=ppt/slides/slide11.xml><?xml version="1.0" encoding="utf-8"?>
+<p:sld xmlns:a="http://schemas.openxmlformats.org/drawingml/2006/main" xmlns:r="http://schemas.openxmlformats.org/officeDocument/2006/relationships" xmlns:p="http://schemas.openxmlformats.org/presentationml/2006/main">
+  <p:cSld>
+    <p:spTree>
+      <p:nvGrpSpPr>
+        <p:cNvPr id="1" name=""/>
+        <p:cNvGrpSpPr/>
+        <p:nvPr/>
+      </p:nvGrpSpPr>
+      <p:grpSpPr>
+        <a:xfrm>
+          <a:off x="0" y="0"/>
+          <a:ext cx="0" cy="0"/>
+          <a:chOff x="0" y="0"/>
+          <a:chExt cx="0" cy="0"/>
+        </a:xfrm>
+      </p:grpSpPr>
+      <p:sp>
+        <p:nvSpPr>
+          <p:cNvPr id="2" name="Title 1"/>
+          <p:cNvSpPr>
+            <a:spLocks noGrp="1"/>
+          </p:cNvSpPr>
+          <p:nvPr>
+            <p:ph type="title"/>
+          </p:nvPr>
+        </p:nvSpPr>
+        <p:spPr/>
+        <p:txBody>
+          <a:bodyPr/>
+          <a:lstStyle/>
+          <a:p>
+            <a:endParaRPr lang="en-US"/>
+          </a:p>
+        </p:txBody>
+      </p:sp>
+      <p:sp>
+        <p:nvSpPr>
+          <p:cNvPr id="3" name="Content Placeholder 2"/>
+          <p:cNvSpPr>
+            <a:spLocks noGrp="1"/>
+          </p:cNvSpPr>
+          <p:nvPr>
+            <p:ph idx="1"/>
+          </p:nvPr>
+        </p:nvSpPr>
+        <p:spPr/>
+        <p:txBody>
+          <a:bodyPr/>
+          <a:lstStyle/>
+          <a:p>
+            <a:endParaRPr lang="en-US"/>
+          </a:p>
+        </p:txBody>
+      </p:sp>
+      <p:sp>
+        <p:nvSpPr>
+          <p:cNvPr id="4" name="Slide Number Placeholder 3"/>
+          <p:cNvSpPr>
+            <a:spLocks noGrp="1"/>
+          </p:cNvSpPr>
+          <p:nvPr>
+            <p:ph type="sldNum" sz="quarter" idx="12"/>
+          </p:nvPr>
+        </p:nvSpPr>
+        <p:spPr/>
+        <p:txBody>
+          <a:bodyPr/>
+          <a:lstStyle/>
+          <a:p>
+            <a:fld id="{4006A555-BC29-4783-AB8D-804806BE464C}" type="slidenum">
+              <a:rPr lang="en-US" smtClean="0"/>
+              <a:pPr/>
+              <a:t>11</a:t>
+            </a:fld>
+            <a:endParaRPr lang="en-US"/>
+          </a:p>
+        </p:txBody>
+      </p:sp>
+      <p:pic>
+        <p:nvPicPr>
+          <p:cNvPr id="3074" name="Picture 2"/>
+          <p:cNvPicPr>
+            <a:picLocks noChangeAspect="1" noChangeArrowheads="1"/>
+          </p:cNvPicPr>
+          <p:nvPr/>
+        </p:nvPicPr>
+        <p:blipFill>
+          <a:blip r:embed="rId2"/>
+          <a:srcRect/>
+          <a:stretch>
+            <a:fillRect/>
+          </a:stretch>
+        </p:blipFill>
+        <p:spPr bwMode="auto">
+          <a:xfrm>
+            <a:off x="704850" y="919163"/>
+            <a:ext cx="7734300" cy="5019675"/>
+          </a:xfrm>
+          <a:prstGeom prst="rect">
+            <a:avLst/>
+          </a:prstGeom>
+          <a:noFill/>
+          <a:ln w="9525">
+            <a:noFill/>
+            <a:miter lim="800000"/>
+            <a:headEnd/>
+            <a:tailEnd/>
+          </a:ln>
+          <a:effectLst/>
+        </p:spPr>
+      </p:pic>
+    </p:spTree>
+  </p:cSld>
+  <p:clrMapOvr>
+    <a:masterClrMapping/>
+  </p:clrMapOvr>
+</p:sld>
+</file>
+
+<file path=ppt/slides/slide12.xml><?xml version="1.0" encoding="utf-8"?>
+<p:sld xmlns:a="http://schemas.openxmlformats.org/drawingml/2006/main" xmlns:r="http://schemas.openxmlformats.org/officeDocument/2006/relationships" xmlns:p="http://schemas.openxmlformats.org/presentationml/2006/main">
+  <p:cSld>
+    <p:spTree>
+      <p:nvGrpSpPr>
+        <p:cNvPr id="1" name=""/>
+        <p:cNvGrpSpPr/>
+        <p:nvPr/>
+      </p:nvGrpSpPr>
+      <p:grpSpPr>
+        <a:xfrm>
+          <a:off x="0" y="0"/>
+          <a:ext cx="0" cy="0"/>
+          <a:chOff x="0" y="0"/>
+          <a:chExt cx="0" cy="0"/>
+        </a:xfrm>
+      </p:grpSpPr>
+      <p:sp>
+        <p:nvSpPr>
+          <p:cNvPr id="2" name="Title 1"/>
+          <p:cNvSpPr>
+            <a:spLocks noGrp="1"/>
+          </p:cNvSpPr>
+          <p:nvPr>
+            <p:ph type="title"/>
+          </p:nvPr>
+        </p:nvSpPr>
+        <p:spPr/>
+        <p:txBody>
+          <a:bodyPr/>
+          <a:lstStyle/>
+          <a:p>
+            <a:endParaRPr lang="en-US"/>
+          </a:p>
+        </p:txBody>
+      </p:sp>
+      <p:sp>
+        <p:nvSpPr>
+          <p:cNvPr id="3" name="Content Placeholder 2"/>
+          <p:cNvSpPr>
+            <a:spLocks noGrp="1"/>
+          </p:cNvSpPr>
+          <p:nvPr>
+            <p:ph idx="1"/>
+          </p:nvPr>
+        </p:nvSpPr>
+        <p:spPr/>
+        <p:txBody>
+          <a:bodyPr/>
+          <a:lstStyle/>
+          <a:p>
+            <a:endParaRPr lang="en-US"/>
+          </a:p>
+        </p:txBody>
+      </p:sp>
+      <p:sp>
+        <p:nvSpPr>
+          <p:cNvPr id="4" name="Slide Number Placeholder 3"/>
+          <p:cNvSpPr>
+            <a:spLocks noGrp="1"/>
+          </p:cNvSpPr>
+          <p:nvPr>
+            <p:ph type="sldNum" sz="quarter" idx="12"/>
+          </p:nvPr>
+        </p:nvSpPr>
+        <p:spPr/>
+        <p:txBody>
+          <a:bodyPr/>
+          <a:lstStyle/>
+          <a:p>
+            <a:fld id="{4006A555-BC29-4783-AB8D-804806BE464C}" type="slidenum">
+              <a:rPr lang="en-US" smtClean="0"/>
+              <a:pPr/>
+              <a:t>12</a:t>
+            </a:fld>
+            <a:endParaRPr lang="en-US"/>
+          </a:p>
+        </p:txBody>
+      </p:sp>
+      <p:pic>
+        <p:nvPicPr>
+          <p:cNvPr id="4098" name="Picture 2"/>
+          <p:cNvPicPr>
+            <a:picLocks noChangeAspect="1" noChangeArrowheads="1"/>
+          </p:cNvPicPr>
+          <p:nvPr/>
+        </p:nvPicPr>
+        <p:blipFill>
+          <a:blip r:embed="rId2"/>
+          <a:srcRect/>
+          <a:stretch>
+            <a:fillRect/>
+          </a:stretch>
+        </p:blipFill>
+        <p:spPr bwMode="auto">
+          <a:xfrm>
+            <a:off x="742950" y="909638"/>
+            <a:ext cx="7658100" cy="5038725"/>
+          </a:xfrm>
+          <a:prstGeom prst="rect">
+            <a:avLst/>
+          </a:prstGeom>
+          <a:noFill/>
+          <a:ln w="9525">
+            <a:noFill/>
+            <a:miter lim="800000"/>
+            <a:headEnd/>
+            <a:tailEnd/>
+          </a:ln>
+          <a:effectLst/>
+        </p:spPr>
+      </p:pic>
+    </p:spTree>
+  </p:cSld>
+  <p:clrMapOvr>
+    <a:masterClrMapping/>
+  </p:clrMapOvr>
+</p:sld>
+</file>
+
+<file path=ppt/slides/slide13.xml><?xml version="1.0" encoding="utf-8"?>
+<p:sld xmlns:a="http://schemas.openxmlformats.org/drawingml/2006/main" xmlns:r="http://schemas.openxmlformats.org/officeDocument/2006/relationships" xmlns:p="http://schemas.openxmlformats.org/presentationml/2006/main">
+  <p:cSld>
+    <p:spTree>
+      <p:nvGrpSpPr>
+        <p:cNvPr id="1" name=""/>
+        <p:cNvGrpSpPr/>
+        <p:nvPr/>
+      </p:nvGrpSpPr>
+      <p:grpSpPr>
+        <a:xfrm>
+          <a:off x="0" y="0"/>
+          <a:ext cx="0" cy="0"/>
+          <a:chOff x="0" y="0"/>
+          <a:chExt cx="0" cy="0"/>
+        </a:xfrm>
+      </p:grpSpPr>
+      <p:sp>
+        <p:nvSpPr>
+          <p:cNvPr id="2" name="Title 1"/>
+          <p:cNvSpPr>
+            <a:spLocks noGrp="1"/>
+          </p:cNvSpPr>
+          <p:nvPr>
+            <p:ph type="title"/>
+          </p:nvPr>
+        </p:nvSpPr>
+        <p:spPr/>
+        <p:txBody>
+          <a:bodyPr/>
+          <a:lstStyle/>
+          <a:p>
+            <a:endParaRPr lang="en-US"/>
+          </a:p>
+        </p:txBody>
+      </p:sp>
+      <p:sp>
+        <p:nvSpPr>
+          <p:cNvPr id="3" name="Content Placeholder 2"/>
+          <p:cNvSpPr>
+            <a:spLocks noGrp="1"/>
+          </p:cNvSpPr>
+          <p:nvPr>
+            <p:ph idx="1"/>
+          </p:nvPr>
+        </p:nvSpPr>
+        <p:spPr/>
+        <p:txBody>
+          <a:bodyPr/>
+          <a:lstStyle/>
+          <a:p>
+            <a:endParaRPr lang="en-US"/>
+          </a:p>
+        </p:txBody>
+      </p:sp>
+      <p:sp>
+        <p:nvSpPr>
+          <p:cNvPr id="4" name="Slide Number Placeholder 3"/>
+          <p:cNvSpPr>
+            <a:spLocks noGrp="1"/>
+          </p:cNvSpPr>
+          <p:nvPr>
+            <p:ph type="sldNum" sz="quarter" idx="12"/>
+          </p:nvPr>
+        </p:nvSpPr>
+        <p:spPr/>
+        <p:txBody>
+          <a:bodyPr/>
+          <a:lstStyle/>
+          <a:p>
+            <a:fld id="{4006A555-BC29-4783-AB8D-804806BE464C}" type="slidenum">
+              <a:rPr lang="en-US" smtClean="0"/>
+              <a:pPr/>
+              <a:t>13</a:t>
+            </a:fld>
+            <a:endParaRPr lang="en-US"/>
+          </a:p>
+        </p:txBody>
+      </p:sp>
+      <p:pic>
+        <p:nvPicPr>
+          <p:cNvPr id="5122" name="Picture 2"/>
+          <p:cNvPicPr>
+            <a:picLocks noChangeAspect="1" noChangeArrowheads="1"/>
+          </p:cNvPicPr>
+          <p:nvPr/>
+        </p:nvPicPr>
+        <p:blipFill>
+          <a:blip r:embed="rId2"/>
+          <a:srcRect/>
+          <a:stretch>
+            <a:fillRect/>
+          </a:stretch>
+        </p:blipFill>
+        <p:spPr bwMode="auto">
+          <a:xfrm>
+            <a:off x="666750" y="957263"/>
+            <a:ext cx="7810500" cy="4943475"/>
+          </a:xfrm>
+          <a:prstGeom prst="rect">
+            <a:avLst/>
+          </a:prstGeom>
+          <a:noFill/>
+          <a:ln w="9525">
+            <a:noFill/>
+            <a:miter lim="800000"/>
+            <a:headEnd/>
+            <a:tailEnd/>
+          </a:ln>
+          <a:effectLst/>
+        </p:spPr>
+      </p:pic>
+    </p:spTree>
+  </p:cSld>
+  <p:clrMapOvr>
+    <a:masterClrMapping/>
+  </p:clrMapOvr>
+</p:sld>
+</file>
+
+<file path=ppt/slides/slide14.xml><?xml version="1.0" encoding="utf-8"?>
+<p:sld xmlns:a="http://schemas.openxmlformats.org/drawingml/2006/main" xmlns:r="http://schemas.openxmlformats.org/officeDocument/2006/relationships" xmlns:p="http://schemas.openxmlformats.org/presentationml/2006/main">
+  <p:cSld>
+    <p:spTree>
+      <p:nvGrpSpPr>
+        <p:cNvPr id="1" name=""/>
+        <p:cNvGrpSpPr/>
+        <p:nvPr/>
+      </p:nvGrpSpPr>
+      <p:grpSpPr>
+        <a:xfrm>
+          <a:off x="0" y="0"/>
+          <a:ext cx="0" cy="0"/>
+          <a:chOff x="0" y="0"/>
+          <a:chExt cx="0" cy="0"/>
+        </a:xfrm>
+      </p:grpSpPr>
+      <p:sp>
+        <p:nvSpPr>
+          <p:cNvPr id="2" name="Title 1"/>
+          <p:cNvSpPr>
+            <a:spLocks noGrp="1"/>
+          </p:cNvSpPr>
+          <p:nvPr>
+            <p:ph type="title"/>
+          </p:nvPr>
+        </p:nvSpPr>
+        <p:spPr/>
+        <p:txBody>
+          <a:bodyPr/>
+          <a:lstStyle/>
+          <a:p>
+            <a:endParaRPr lang="en-US"/>
+          </a:p>
+        </p:txBody>
+      </p:sp>
+      <p:sp>
+        <p:nvSpPr>
+          <p:cNvPr id="3" name="Content Placeholder 2"/>
+          <p:cNvSpPr>
+            <a:spLocks noGrp="1"/>
+          </p:cNvSpPr>
+          <p:nvPr>
+            <p:ph idx="1"/>
+          </p:nvPr>
+        </p:nvSpPr>
+        <p:spPr/>
+        <p:txBody>
+          <a:bodyPr/>
+          <a:lstStyle/>
+          <a:p>
+            <a:endParaRPr lang="en-US"/>
+          </a:p>
+        </p:txBody>
+      </p:sp>
+      <p:sp>
+        <p:nvSpPr>
+          <p:cNvPr id="4" name="Slide Number Placeholder 3"/>
+          <p:cNvSpPr>
+            <a:spLocks noGrp="1"/>
+          </p:cNvSpPr>
+          <p:nvPr>
+            <p:ph type="sldNum" sz="quarter" idx="12"/>
+          </p:nvPr>
+        </p:nvSpPr>
+        <p:spPr/>
+        <p:txBody>
+          <a:bodyPr/>
+          <a:lstStyle/>
+          <a:p>
+            <a:fld id="{4006A555-BC29-4783-AB8D-804806BE464C}" type="slidenum">
+              <a:rPr lang="en-US" smtClean="0"/>
+              <a:pPr/>
+              <a:t>14</a:t>
+            </a:fld>
+            <a:endParaRPr lang="en-US"/>
+          </a:p>
+        </p:txBody>
+      </p:sp>
+      <p:pic>
+        <p:nvPicPr>
+          <p:cNvPr id="6146" name="Picture 2"/>
+          <p:cNvPicPr>
+            <a:picLocks noChangeAspect="1" noChangeArrowheads="1"/>
+          </p:cNvPicPr>
+          <p:nvPr/>
+        </p:nvPicPr>
+        <p:blipFill>
+          <a:blip r:embed="rId2"/>
+          <a:srcRect/>
+          <a:stretch>
+            <a:fillRect/>
+          </a:stretch>
+        </p:blipFill>
+        <p:spPr bwMode="auto">
+          <a:xfrm>
+            <a:off x="623888" y="1133475"/>
+            <a:ext cx="7896225" cy="4591050"/>
+          </a:xfrm>
+          <a:prstGeom prst="rect">
+            <a:avLst/>
+          </a:prstGeom>
+          <a:noFill/>
+          <a:ln w="9525">
+            <a:noFill/>
+            <a:miter lim="800000"/>
+            <a:headEnd/>
+            <a:tailEnd/>
+          </a:ln>
+          <a:effectLst/>
+        </p:spPr>
+      </p:pic>
+    </p:spTree>
+  </p:cSld>
+  <p:clrMapOvr>
+    <a:masterClrMapping/>
+  </p:clrMapOvr>
+</p:sld>
+</file>
+
+<file path=ppt/slides/slide15.xml><?xml version="1.0" encoding="utf-8"?>
+<p:sld xmlns:a="http://schemas.openxmlformats.org/drawingml/2006/main" xmlns:r="http://schemas.openxmlformats.org/officeDocument/2006/relationships" xmlns:p="http://schemas.openxmlformats.org/presentationml/2006/main">
+  <p:cSld>
+    <p:spTree>
+      <p:nvGrpSpPr>
+        <p:cNvPr id="1" name=""/>
+        <p:cNvGrpSpPr/>
+        <p:nvPr/>
+      </p:nvGrpSpPr>
+      <p:grpSpPr>
+        <a:xfrm>
+          <a:off x="0" y="0"/>
+          <a:ext cx="0" cy="0"/>
+          <a:chOff x="0" y="0"/>
+          <a:chExt cx="0" cy="0"/>
+        </a:xfrm>
+      </p:grpSpPr>
+      <p:sp>
+        <p:nvSpPr>
+          <p:cNvPr id="2" name="Title 1"/>
+          <p:cNvSpPr>
+            <a:spLocks noGrp="1"/>
+          </p:cNvSpPr>
+          <p:nvPr>
+            <p:ph type="title"/>
+          </p:nvPr>
+        </p:nvSpPr>
+        <p:spPr/>
+        <p:txBody>
+          <a:bodyPr/>
+          <a:lstStyle/>
+          <a:p>
+            <a:endParaRPr lang="en-US"/>
+          </a:p>
+        </p:txBody>
+      </p:sp>
+      <p:sp>
+        <p:nvSpPr>
+          <p:cNvPr id="3" name="Content Placeholder 2"/>
+          <p:cNvSpPr>
+            <a:spLocks noGrp="1"/>
+          </p:cNvSpPr>
+          <p:nvPr>
+            <p:ph idx="1"/>
+          </p:nvPr>
+        </p:nvSpPr>
+        <p:spPr/>
+        <p:txBody>
+          <a:bodyPr/>
+          <a:lstStyle/>
+          <a:p>
+            <a:endParaRPr lang="en-US"/>
+          </a:p>
+        </p:txBody>
+      </p:sp>
+      <p:sp>
+        <p:nvSpPr>
+          <p:cNvPr id="4" name="Slide Number Placeholder 3"/>
+          <p:cNvSpPr>
+            <a:spLocks noGrp="1"/>
+          </p:cNvSpPr>
+          <p:nvPr>
+            <p:ph type="sldNum" sz="quarter" idx="12"/>
+          </p:nvPr>
+        </p:nvSpPr>
+        <p:spPr/>
+        <p:txBody>
+          <a:bodyPr/>
+          <a:lstStyle/>
+          <a:p>
+            <a:fld id="{4006A555-BC29-4783-AB8D-804806BE464C}" type="slidenum">
+              <a:rPr lang="en-US" smtClean="0"/>
+              <a:pPr/>
+              <a:t>15</a:t>
+            </a:fld>
+            <a:endParaRPr lang="en-US"/>
+          </a:p>
+        </p:txBody>
+      </p:sp>
+      <p:pic>
+        <p:nvPicPr>
+          <p:cNvPr id="7170" name="Picture 2"/>
+          <p:cNvPicPr>
+            <a:picLocks noChangeAspect="1" noChangeArrowheads="1"/>
+          </p:cNvPicPr>
+          <p:nvPr/>
+        </p:nvPicPr>
+        <p:blipFill>
+          <a:blip r:embed="rId2"/>
+          <a:srcRect/>
+          <a:stretch>
+            <a:fillRect/>
+          </a:stretch>
+        </p:blipFill>
+        <p:spPr bwMode="auto">
+          <a:xfrm>
+            <a:off x="619125" y="852488"/>
+            <a:ext cx="7905750" cy="5153025"/>
+          </a:xfrm>
+          <a:prstGeom prst="rect">
+            <a:avLst/>
+          </a:prstGeom>
+          <a:noFill/>
+          <a:ln w="9525">
+            <a:noFill/>
+            <a:miter lim="800000"/>
+            <a:headEnd/>
+            <a:tailEnd/>
+          </a:ln>
+          <a:effectLst/>
+        </p:spPr>
+      </p:pic>
+    </p:spTree>
+  </p:cSld>
+  <p:clrMapOvr>
+    <a:masterClrMapping/>
+  </p:clrMapOvr>
+  <p:timing>
+    <p:tnLst>
+      <p:par>
+        <p:cTn id="1" dur="indefinite" restart="never" nodeType="tmRoot"/>
+      </p:par>
+    </p:tnLst>
+  </p:timing>
+</p:sld>
+</file>
+
+<file path=ppt/slides/slide16.xml><?xml version="1.0" encoding="utf-8"?>
+<p:sld xmlns:a="http://schemas.openxmlformats.org/drawingml/2006/main" xmlns:r="http://schemas.openxmlformats.org/officeDocument/2006/relationships" xmlns:p="http://schemas.openxmlformats.org/presentationml/2006/main">
+  <p:cSld>
+    <p:spTree>
+      <p:nvGrpSpPr>
+        <p:cNvPr id="1" name=""/>
+        <p:cNvGrpSpPr/>
+        <p:nvPr/>
+      </p:nvGrpSpPr>
+      <p:grpSpPr>
+        <a:xfrm>
+          <a:off x="0" y="0"/>
+          <a:ext cx="0" cy="0"/>
+          <a:chOff x="0" y="0"/>
+          <a:chExt cx="0" cy="0"/>
+        </a:xfrm>
+      </p:grpSpPr>
+      <p:sp>
+        <p:nvSpPr>
+          <p:cNvPr id="2" name="Title 1"/>
+          <p:cNvSpPr>
+            <a:spLocks noGrp="1"/>
+          </p:cNvSpPr>
+          <p:nvPr>
+            <p:ph type="title"/>
+          </p:nvPr>
+        </p:nvSpPr>
+        <p:spPr/>
+        <p:txBody>
+          <a:bodyPr/>
+          <a:lstStyle/>
+          <a:p>
+            <a:endParaRPr lang="en-US"/>
+          </a:p>
+        </p:txBody>
+      </p:sp>
+      <p:sp>
+        <p:nvSpPr>
+          <p:cNvPr id="3" name="Content Placeholder 2"/>
+          <p:cNvSpPr>
+            <a:spLocks noGrp="1"/>
+          </p:cNvSpPr>
+          <p:nvPr>
+            <p:ph idx="1"/>
+          </p:nvPr>
+        </p:nvSpPr>
+        <p:spPr/>
+        <p:txBody>
+          <a:bodyPr/>
+          <a:lstStyle/>
+          <a:p>
+            <a:endParaRPr lang="en-US"/>
+          </a:p>
+        </p:txBody>
+      </p:sp>
+      <p:sp>
+        <p:nvSpPr>
+          <p:cNvPr id="4" name="Slide Number Placeholder 3"/>
+          <p:cNvSpPr>
+            <a:spLocks noGrp="1"/>
+          </p:cNvSpPr>
+          <p:nvPr>
+            <p:ph type="sldNum" sz="quarter" idx="12"/>
+          </p:nvPr>
+        </p:nvSpPr>
+        <p:spPr/>
+        <p:txBody>
+          <a:bodyPr/>
+          <a:lstStyle/>
+          <a:p>
+            <a:fld id="{4006A555-BC29-4783-AB8D-804806BE464C}" type="slidenum">
+              <a:rPr lang="en-US" smtClean="0"/>
+              <a:pPr/>
+              <a:t>16</a:t>
+            </a:fld>
+            <a:endParaRPr lang="en-US"/>
+          </a:p>
+        </p:txBody>
+      </p:sp>
+      <p:pic>
+        <p:nvPicPr>
+          <p:cNvPr id="8194" name="Picture 2"/>
+          <p:cNvPicPr>
+            <a:picLocks noChangeAspect="1" noChangeArrowheads="1"/>
+          </p:cNvPicPr>
+          <p:nvPr/>
+        </p:nvPicPr>
+        <p:blipFill>
+          <a:blip r:embed="rId2"/>
+          <a:srcRect/>
+          <a:stretch>
+            <a:fillRect/>
+          </a:stretch>
+        </p:blipFill>
+        <p:spPr bwMode="auto">
+          <a:xfrm>
+            <a:off x="628650" y="942975"/>
+            <a:ext cx="7886700" cy="4972050"/>
+          </a:xfrm>
+          <a:prstGeom prst="rect">
+            <a:avLst/>
+          </a:prstGeom>
+          <a:noFill/>
+          <a:ln w="9525">
+            <a:noFill/>
+            <a:miter lim="800000"/>
+            <a:headEnd/>
+            <a:tailEnd/>
+          </a:ln>
+          <a:effectLst/>
+        </p:spPr>
+      </p:pic>
+    </p:spTree>
+  </p:cSld>
+  <p:clrMapOvr>
+    <a:masterClrMapping/>
+  </p:clrMapOvr>
+  <p:timing>
+    <p:tnLst>
+      <p:par>
+        <p:cTn id="1" dur="indefinite" restart="never" nodeType="tmRoot"/>
+      </p:par>
+    </p:tnLst>
+  </p:timing>
+</p:sld>
+</file>
+
+<file path=ppt/slides/slide17.xml><?xml version="1.0" encoding="utf-8"?>
+<p:sld xmlns:a="http://schemas.openxmlformats.org/drawingml/2006/main" xmlns:r="http://schemas.openxmlformats.org/officeDocument/2006/relationships" xmlns:p="http://schemas.openxmlformats.org/presentationml/2006/main">
+  <p:cSld>
+    <p:spTree>
+      <p:nvGrpSpPr>
+        <p:cNvPr id="1" name=""/>
+        <p:cNvGrpSpPr/>
+        <p:nvPr/>
+      </p:nvGrpSpPr>
+      <p:grpSpPr>
+        <a:xfrm>
+          <a:off x="0" y="0"/>
+          <a:ext cx="0" cy="0"/>
+          <a:chOff x="0" y="0"/>
+          <a:chExt cx="0" cy="0"/>
+        </a:xfrm>
+      </p:grpSpPr>
+      <p:sp>
+        <p:nvSpPr>
+          <p:cNvPr id="2" name="Title 1"/>
+          <p:cNvSpPr>
+            <a:spLocks noGrp="1"/>
+          </p:cNvSpPr>
+          <p:nvPr>
+            <p:ph type="title"/>
+          </p:nvPr>
+        </p:nvSpPr>
+        <p:spPr/>
+        <p:txBody>
+          <a:bodyPr/>
+          <a:lstStyle/>
+          <a:p>
+            <a:endParaRPr lang="en-US"/>
+          </a:p>
+        </p:txBody>
+      </p:sp>
+      <p:sp>
+        <p:nvSpPr>
+          <p:cNvPr id="3" name="Content Placeholder 2"/>
+          <p:cNvSpPr>
+            <a:spLocks noGrp="1"/>
+          </p:cNvSpPr>
+          <p:nvPr>
+            <p:ph idx="1"/>
+          </p:nvPr>
+        </p:nvSpPr>
+        <p:spPr/>
+        <p:txBody>
+          <a:bodyPr/>
+          <a:lstStyle/>
+          <a:p>
+            <a:endParaRPr lang="en-US"/>
+          </a:p>
+        </p:txBody>
+      </p:sp>
+      <p:sp>
+        <p:nvSpPr>
+          <p:cNvPr id="4" name="Slide Number Placeholder 3"/>
+          <p:cNvSpPr>
+            <a:spLocks noGrp="1"/>
+          </p:cNvSpPr>
+          <p:nvPr>
+            <p:ph type="sldNum" sz="quarter" idx="12"/>
+          </p:nvPr>
+        </p:nvSpPr>
+        <p:spPr/>
+        <p:txBody>
+          <a:bodyPr/>
+          <a:lstStyle/>
+          <a:p>
+            <a:fld id="{4006A555-BC29-4783-AB8D-804806BE464C}" type="slidenum">
+              <a:rPr lang="en-US" smtClean="0"/>
+              <a:pPr/>
+              <a:t>17</a:t>
+            </a:fld>
+            <a:endParaRPr lang="en-US"/>
+          </a:p>
+        </p:txBody>
+      </p:sp>
+      <p:pic>
+        <p:nvPicPr>
+          <p:cNvPr id="5" name="Picture 4"/>
+          <p:cNvPicPr/>
+          <p:nvPr/>
+        </p:nvPicPr>
+        <p:blipFill>
+          <a:blip r:embed="rId2"/>
+          <a:srcRect/>
+          <a:stretch>
+            <a:fillRect/>
+          </a:stretch>
+        </p:blipFill>
+        <p:spPr bwMode="auto">
+          <a:xfrm>
+            <a:off x="533400" y="838200"/>
+            <a:ext cx="8077200" cy="5105400"/>
+          </a:xfrm>
+          <a:prstGeom prst="rect">
+            <a:avLst/>
+          </a:prstGeom>
+          <a:noFill/>
+          <a:ln w="9525">
+            <a:noFill/>
+            <a:miter lim="800000"/>
+            <a:headEnd/>
+            <a:tailEnd/>
+          </a:ln>
+        </p:spPr>
+      </p:pic>
+    </p:spTree>
+  </p:cSld>
+  <p:clrMapOvr>
+    <a:masterClrMapping/>
+  </p:clrMapOvr>
+  <p:timing>
+    <p:tnLst>
+      <p:par>
+        <p:cTn id="1" dur="indefinite" restart="never" nodeType="tmRoot"/>
+      </p:par>
+    </p:tnLst>
+  </p:timing>
+</p:sld>
+</file>
+
+<file path=ppt/slides/slide18.xml><?xml version="1.0" encoding="utf-8"?>
+<p:sld xmlns:a="http://schemas.openxmlformats.org/drawingml/2006/main" xmlns:r="http://schemas.openxmlformats.org/officeDocument/2006/relationships" xmlns:p="http://schemas.openxmlformats.org/presentationml/2006/main">
+  <p:cSld>
+    <p:spTree>
+      <p:nvGrpSpPr>
+        <p:cNvPr id="1" name=""/>
+        <p:cNvGrpSpPr/>
+        <p:nvPr/>
+      </p:nvGrpSpPr>
+      <p:grpSpPr>
+        <a:xfrm>
+          <a:off x="0" y="0"/>
+          <a:ext cx="0" cy="0"/>
+          <a:chOff x="0" y="0"/>
+          <a:chExt cx="0" cy="0"/>
+        </a:xfrm>
+      </p:grpSpPr>
+      <p:sp>
+        <p:nvSpPr>
+          <p:cNvPr id="2" name="Title 1"/>
+          <p:cNvSpPr>
+            <a:spLocks noGrp="1"/>
+          </p:cNvSpPr>
+          <p:nvPr>
+            <p:ph type="title"/>
+          </p:nvPr>
+        </p:nvSpPr>
+        <p:spPr/>
+        <p:txBody>
+          <a:bodyPr/>
+          <a:lstStyle/>
+          <a:p>
+            <a:endParaRPr lang="en-US"/>
+          </a:p>
+        </p:txBody>
+      </p:sp>
+      <p:sp>
+        <p:nvSpPr>
+          <p:cNvPr id="3" name="Content Placeholder 2"/>
+          <p:cNvSpPr>
+            <a:spLocks noGrp="1"/>
+          </p:cNvSpPr>
+          <p:nvPr>
+            <p:ph idx="1"/>
+          </p:nvPr>
+        </p:nvSpPr>
+        <p:spPr/>
+        <p:txBody>
+          <a:bodyPr/>
+          <a:lstStyle/>
+          <a:p>
+            <a:endParaRPr lang="en-US"/>
+          </a:p>
+        </p:txBody>
+      </p:sp>
+      <p:sp>
+        <p:nvSpPr>
+          <p:cNvPr id="4" name="Slide Number Placeholder 3"/>
+          <p:cNvSpPr>
+            <a:spLocks noGrp="1"/>
+          </p:cNvSpPr>
+          <p:nvPr>
+            <p:ph type="sldNum" sz="quarter" idx="12"/>
+          </p:nvPr>
+        </p:nvSpPr>
+        <p:spPr/>
+        <p:txBody>
+          <a:bodyPr/>
+          <a:lstStyle/>
+          <a:p>
+            <a:fld id="{4006A555-BC29-4783-AB8D-804806BE464C}" type="slidenum">
+              <a:rPr lang="en-US" smtClean="0"/>
+              <a:pPr/>
+              <a:t>18</a:t>
+            </a:fld>
+            <a:endParaRPr lang="en-US"/>
+          </a:p>
+        </p:txBody>
+      </p:sp>
+      <p:pic>
+        <p:nvPicPr>
+          <p:cNvPr id="9218" name="Picture 2"/>
+          <p:cNvPicPr>
+            <a:picLocks noChangeAspect="1" noChangeArrowheads="1"/>
+          </p:cNvPicPr>
+          <p:nvPr/>
+        </p:nvPicPr>
+        <p:blipFill>
+          <a:blip r:embed="rId2"/>
+          <a:srcRect/>
+          <a:stretch>
+            <a:fillRect/>
+          </a:stretch>
+        </p:blipFill>
+        <p:spPr bwMode="auto">
+          <a:xfrm>
+            <a:off x="766763" y="976313"/>
+            <a:ext cx="7610475" cy="4905375"/>
+          </a:xfrm>
+          <a:prstGeom prst="rect">
+            <a:avLst/>
+          </a:prstGeom>
+          <a:noFill/>
+          <a:ln w="9525">
+            <a:noFill/>
+            <a:miter lim="800000"/>
+            <a:headEnd/>
+            <a:tailEnd/>
+          </a:ln>
+          <a:effectLst/>
+        </p:spPr>
+      </p:pic>
+    </p:spTree>
+  </p:cSld>
+  <p:clrMapOvr>
+    <a:masterClrMapping/>
+  </p:clrMapOvr>
+</p:sld>
+</file>
+
+<file path=ppt/slides/slide19.xml><?xml version="1.0" encoding="utf-8"?>
+<p:sld xmlns:a="http://schemas.openxmlformats.org/drawingml/2006/main" xmlns:r="http://schemas.openxmlformats.org/officeDocument/2006/relationships" xmlns:p="http://schemas.openxmlformats.org/presentationml/2006/main">
+  <p:cSld>
+    <p:spTree>
+      <p:nvGrpSpPr>
+        <p:cNvPr id="1" name=""/>
+        <p:cNvGrpSpPr/>
+        <p:nvPr/>
+      </p:nvGrpSpPr>
+      <p:grpSpPr>
+        <a:xfrm>
+          <a:off x="0" y="0"/>
+          <a:ext cx="0" cy="0"/>
+          <a:chOff x="0" y="0"/>
+          <a:chExt cx="0" cy="0"/>
+        </a:xfrm>
+      </p:grpSpPr>
+      <p:sp>
+        <p:nvSpPr>
+          <p:cNvPr id="2" name="Title 1"/>
+          <p:cNvSpPr>
+            <a:spLocks noGrp="1"/>
+          </p:cNvSpPr>
+          <p:nvPr>
+            <p:ph type="title"/>
+          </p:nvPr>
+        </p:nvSpPr>
+        <p:spPr/>
+        <p:txBody>
+          <a:bodyPr/>
+          <a:lstStyle/>
+          <a:p>
+            <a:endParaRPr lang="en-US"/>
+          </a:p>
+        </p:txBody>
+      </p:sp>
+      <p:sp>
+        <p:nvSpPr>
+          <p:cNvPr id="3" name="Content Placeholder 2"/>
+          <p:cNvSpPr>
+            <a:spLocks noGrp="1"/>
+          </p:cNvSpPr>
+          <p:nvPr>
+            <p:ph idx="1"/>
+          </p:nvPr>
+        </p:nvSpPr>
+        <p:spPr/>
+        <p:txBody>
+          <a:bodyPr/>
+          <a:lstStyle/>
+          <a:p>
+            <a:endParaRPr lang="en-US"/>
+          </a:p>
+        </p:txBody>
+      </p:sp>
+      <p:sp>
+        <p:nvSpPr>
+          <p:cNvPr id="4" name="Slide Number Placeholder 3"/>
+          <p:cNvSpPr>
+            <a:spLocks noGrp="1"/>
+          </p:cNvSpPr>
+          <p:nvPr>
+            <p:ph type="sldNum" sz="quarter" idx="12"/>
+          </p:nvPr>
+        </p:nvSpPr>
+        <p:spPr/>
+        <p:txBody>
+          <a:bodyPr/>
+          <a:lstStyle/>
+          <a:p>
+            <a:fld id="{4006A555-BC29-4783-AB8D-804806BE464C}" type="slidenum">
+              <a:rPr lang="en-US" smtClean="0"/>
+              <a:pPr/>
+              <a:t>19</a:t>
+            </a:fld>
+            <a:endParaRPr lang="en-US"/>
+          </a:p>
+        </p:txBody>
+      </p:sp>
+      <p:sp>
+        <p:nvSpPr>
+          <p:cNvPr id="5" name="Content Placeholder 2"/>
+          <p:cNvSpPr txBox="1">
+            <a:spLocks/>
+          </p:cNvSpPr>
+          <p:nvPr/>
+        </p:nvSpPr>
+        <p:spPr>
+          <a:xfrm>
+            <a:off x="381000" y="1524000"/>
+            <a:ext cx="8229600" cy="4525963"/>
+          </a:xfrm>
+          <a:prstGeom prst="rect">
+            <a:avLst/>
+          </a:prstGeom>
+        </p:spPr>
+        <p:txBody>
+          <a:bodyPr vert="horz" lIns="91440" tIns="45720" rIns="91440" bIns="45720" rtlCol="0">
+            <a:normAutofit/>
+          </a:bodyPr>
+          <a:lstStyle/>
+          <a:p>
+            <a:pPr marL="342900" marR="0" lvl="0" indent="-342900" algn="l" defTabSz="914400" rtl="0" eaLnBrk="1" fontAlgn="auto" latinLnBrk="0" hangingPunct="1">
+              <a:lnSpc>
+                <a:spcPct val="100000"/>
+              </a:lnSpc>
+              <a:spcBef>
+                <a:spcPct val="20000"/>
+              </a:spcBef>
+              <a:spcAft>
+                <a:spcPts val="0"/>
+              </a:spcAft>
+              <a:buClrTx/>
+              <a:buSzTx/>
+              <a:buFont typeface="Arial" pitchFamily="34" charset="0"/>
+              <a:buChar char="•"/>
+              <a:tabLst/>
+              <a:defRPr/>
+            </a:pPr>
+            <a:endParaRPr kumimoji="0" lang="en-US" sz="3200" b="0" i="0" u="none" strike="noStrike" kern="1200" cap="none" spc="0" normalizeH="0" baseline="0" noProof="0">
+              <a:ln>
+                <a:noFill/>
+              </a:ln>
+              <a:solidFill>
+                <a:schemeClr val="tx1"/>
+              </a:solidFill>
+              <a:effectLst/>
+              <a:uLnTx/>
+              <a:uFillTx/>
+              <a:latin typeface="+mn-lt"/>
+              <a:ea typeface="+mn-ea"/>
+              <a:cs typeface="+mn-cs"/>
+            </a:endParaRPr>
+          </a:p>
+        </p:txBody>
+      </p:sp>
+      <p:pic>
+        <p:nvPicPr>
+          <p:cNvPr id="10242" name="Picture 2"/>
+          <p:cNvPicPr>
+            <a:picLocks noChangeAspect="1" noChangeArrowheads="1"/>
+          </p:cNvPicPr>
+          <p:nvPr/>
+        </p:nvPicPr>
+        <p:blipFill>
+          <a:blip r:embed="rId2"/>
+          <a:srcRect/>
+          <a:stretch>
+            <a:fillRect/>
+          </a:stretch>
+        </p:blipFill>
+        <p:spPr bwMode="auto">
+          <a:xfrm>
+            <a:off x="742950" y="971550"/>
+            <a:ext cx="7658100" cy="4914900"/>
+          </a:xfrm>
+          <a:prstGeom prst="rect">
+            <a:avLst/>
+          </a:prstGeom>
+          <a:noFill/>
+          <a:ln w="9525">
+            <a:noFill/>
+            <a:miter lim="800000"/>
+            <a:headEnd/>
+            <a:tailEnd/>
+          </a:ln>
+          <a:effectLst/>
+        </p:spPr>
+      </p:pic>
     </p:spTree>
   </p:cSld>
   <p:clrMapOvr>
@@ -3600,12 +4927,1041 @@
           <a:p>
             <a:fld id="{4006A555-BC29-4783-AB8D-804806BE464C}" type="slidenum">
               <a:rPr lang="en-US" smtClean="0"/>
+              <a:pPr/>
               <a:t>2</a:t>
             </a:fld>
             <a:endParaRPr lang="en-US"/>
           </a:p>
         </p:txBody>
       </p:sp>
+    </p:spTree>
+  </p:cSld>
+  <p:clrMapOvr>
+    <a:masterClrMapping/>
+  </p:clrMapOvr>
+  <p:timing>
+    <p:tnLst>
+      <p:par>
+        <p:cTn id="1" dur="indefinite" restart="never" nodeType="tmRoot"/>
+      </p:par>
+    </p:tnLst>
+  </p:timing>
+</p:sld>
+</file>
+
+<file path=ppt/slides/slide20.xml><?xml version="1.0" encoding="utf-8"?>
+<p:sld xmlns:a="http://schemas.openxmlformats.org/drawingml/2006/main" xmlns:r="http://schemas.openxmlformats.org/officeDocument/2006/relationships" xmlns:p="http://schemas.openxmlformats.org/presentationml/2006/main">
+  <p:cSld>
+    <p:spTree>
+      <p:nvGrpSpPr>
+        <p:cNvPr id="1" name=""/>
+        <p:cNvGrpSpPr/>
+        <p:nvPr/>
+      </p:nvGrpSpPr>
+      <p:grpSpPr>
+        <a:xfrm>
+          <a:off x="0" y="0"/>
+          <a:ext cx="0" cy="0"/>
+          <a:chOff x="0" y="0"/>
+          <a:chExt cx="0" cy="0"/>
+        </a:xfrm>
+      </p:grpSpPr>
+      <p:sp>
+        <p:nvSpPr>
+          <p:cNvPr id="2" name="Title 1"/>
+          <p:cNvSpPr>
+            <a:spLocks noGrp="1"/>
+          </p:cNvSpPr>
+          <p:nvPr>
+            <p:ph type="title"/>
+          </p:nvPr>
+        </p:nvSpPr>
+        <p:spPr/>
+        <p:txBody>
+          <a:bodyPr/>
+          <a:lstStyle/>
+          <a:p>
+            <a:endParaRPr lang="en-US"/>
+          </a:p>
+        </p:txBody>
+      </p:sp>
+      <p:sp>
+        <p:nvSpPr>
+          <p:cNvPr id="4" name="Slide Number Placeholder 3"/>
+          <p:cNvSpPr>
+            <a:spLocks noGrp="1"/>
+          </p:cNvSpPr>
+          <p:nvPr>
+            <p:ph type="sldNum" sz="quarter" idx="12"/>
+          </p:nvPr>
+        </p:nvSpPr>
+        <p:spPr/>
+        <p:txBody>
+          <a:bodyPr/>
+          <a:lstStyle/>
+          <a:p>
+            <a:fld id="{4006A555-BC29-4783-AB8D-804806BE464C}" type="slidenum">
+              <a:rPr lang="en-US" smtClean="0"/>
+              <a:pPr/>
+              <a:t>20</a:t>
+            </a:fld>
+            <a:endParaRPr lang="en-US"/>
+          </a:p>
+        </p:txBody>
+      </p:sp>
+      <p:pic>
+        <p:nvPicPr>
+          <p:cNvPr id="1026" name="Picture 2"/>
+          <p:cNvPicPr>
+            <a:picLocks noChangeAspect="1" noChangeArrowheads="1"/>
+          </p:cNvPicPr>
+          <p:nvPr/>
+        </p:nvPicPr>
+        <p:blipFill>
+          <a:blip r:embed="rId2"/>
+          <a:srcRect/>
+          <a:stretch>
+            <a:fillRect/>
+          </a:stretch>
+        </p:blipFill>
+        <p:spPr bwMode="auto">
+          <a:xfrm>
+            <a:off x="685800" y="1676400"/>
+            <a:ext cx="7439025" cy="1071562"/>
+          </a:xfrm>
+          <a:prstGeom prst="rect">
+            <a:avLst/>
+          </a:prstGeom>
+          <a:noFill/>
+          <a:ln w="9525">
+            <a:noFill/>
+            <a:miter lim="800000"/>
+            <a:headEnd/>
+            <a:tailEnd/>
+          </a:ln>
+          <a:effectLst/>
+        </p:spPr>
+      </p:pic>
+      <p:pic>
+        <p:nvPicPr>
+          <p:cNvPr id="1027" name="Picture 3"/>
+          <p:cNvPicPr>
+            <a:picLocks noChangeAspect="1" noChangeArrowheads="1"/>
+          </p:cNvPicPr>
+          <p:nvPr/>
+        </p:nvPicPr>
+        <p:blipFill>
+          <a:blip r:embed="rId3"/>
+          <a:srcRect/>
+          <a:stretch>
+            <a:fillRect/>
+          </a:stretch>
+        </p:blipFill>
+        <p:spPr bwMode="auto">
+          <a:xfrm>
+            <a:off x="2590800" y="609600"/>
+            <a:ext cx="4223905" cy="685800"/>
+          </a:xfrm>
+          <a:prstGeom prst="rect">
+            <a:avLst/>
+          </a:prstGeom>
+          <a:noFill/>
+          <a:ln w="9525">
+            <a:noFill/>
+            <a:miter lim="800000"/>
+            <a:headEnd/>
+            <a:tailEnd/>
+          </a:ln>
+          <a:effectLst/>
+        </p:spPr>
+      </p:pic>
+      <p:pic>
+        <p:nvPicPr>
+          <p:cNvPr id="1028" name="Picture 4"/>
+          <p:cNvPicPr>
+            <a:picLocks noChangeAspect="1" noChangeArrowheads="1"/>
+          </p:cNvPicPr>
+          <p:nvPr/>
+        </p:nvPicPr>
+        <p:blipFill>
+          <a:blip r:embed="rId4"/>
+          <a:srcRect/>
+          <a:stretch>
+            <a:fillRect/>
+          </a:stretch>
+        </p:blipFill>
+        <p:spPr bwMode="auto">
+          <a:xfrm>
+            <a:off x="4800600" y="2743200"/>
+            <a:ext cx="1981200" cy="342900"/>
+          </a:xfrm>
+          <a:prstGeom prst="rect">
+            <a:avLst/>
+          </a:prstGeom>
+          <a:noFill/>
+          <a:ln w="9525">
+            <a:noFill/>
+            <a:miter lim="800000"/>
+            <a:headEnd/>
+            <a:tailEnd/>
+          </a:ln>
+          <a:effectLst/>
+        </p:spPr>
+      </p:pic>
+      <p:sp>
+        <p:nvSpPr>
+          <p:cNvPr id="8" name="TextBox 7">
+            <a:hlinkClick r:id="rId5"/>
+          </p:cNvPr>
+          <p:cNvSpPr txBox="1"/>
+          <p:nvPr/>
+        </p:nvSpPr>
+        <p:spPr>
+          <a:xfrm>
+            <a:off x="1905000" y="3581400"/>
+            <a:ext cx="5562600" cy="369332"/>
+          </a:xfrm>
+          <a:prstGeom prst="rect">
+            <a:avLst/>
+          </a:prstGeom>
+          <a:noFill/>
+        </p:spPr>
+        <p:txBody>
+          <a:bodyPr wrap="square" rtlCol="0">
+            <a:spAutoFit/>
+          </a:bodyPr>
+          <a:lstStyle/>
+          <a:p>
+            <a:r>
+              <a:rPr lang="en-US" b="1" dirty="0" smtClean="0">
+                <a:solidFill>
+                  <a:srgbClr val="0070C0"/>
+                </a:solidFill>
+              </a:rPr>
+              <a:t>https://sebhastian.com/list-comprehension-javascript/</a:t>
+            </a:r>
+            <a:endParaRPr lang="en-US" b="1" dirty="0">
+              <a:solidFill>
+                <a:srgbClr val="0070C0"/>
+              </a:solidFill>
+            </a:endParaRPr>
+          </a:p>
+        </p:txBody>
+      </p:sp>
+      <p:sp>
+        <p:nvSpPr>
+          <p:cNvPr id="10" name="TextBox 9"/>
+          <p:cNvSpPr txBox="1"/>
+          <p:nvPr/>
+        </p:nvSpPr>
+        <p:spPr>
+          <a:xfrm>
+            <a:off x="533400" y="4495800"/>
+            <a:ext cx="6412076" cy="923330"/>
+          </a:xfrm>
+          <a:prstGeom prst="rect">
+            <a:avLst/>
+          </a:prstGeom>
+          <a:noFill/>
+        </p:spPr>
+        <p:txBody>
+          <a:bodyPr wrap="none" rtlCol="0">
+            <a:spAutoFit/>
+          </a:bodyPr>
+          <a:lstStyle/>
+          <a:p>
+            <a:r>
+              <a:rPr lang="en-US" b="1" dirty="0" smtClean="0">
+                <a:solidFill>
+                  <a:srgbClr val="0070C0"/>
+                </a:solidFill>
+              </a:rPr>
+              <a:t>Note:</a:t>
+            </a:r>
+          </a:p>
+          <a:p>
+            <a:pPr marL="342900" indent="-342900">
+              <a:buAutoNum type="arabicPeriod"/>
+            </a:pPr>
+            <a:r>
+              <a:rPr lang="en-US" b="1" dirty="0" smtClean="0"/>
+              <a:t>The next module deals with Built-In Objects like Set and Map.</a:t>
+            </a:r>
+          </a:p>
+          <a:p>
+            <a:pPr marL="342900" indent="-342900">
+              <a:buAutoNum type="arabicPeriod"/>
+            </a:pPr>
+            <a:r>
+              <a:rPr lang="en-US" b="1" dirty="0" smtClean="0"/>
+              <a:t>The following slides are simply informative in nature.</a:t>
+            </a:r>
+            <a:endParaRPr lang="en-US" b="1" dirty="0"/>
+          </a:p>
+        </p:txBody>
+      </p:sp>
+    </p:spTree>
+  </p:cSld>
+  <p:clrMapOvr>
+    <a:masterClrMapping/>
+  </p:clrMapOvr>
+  <p:timing>
+    <p:tnLst>
+      <p:par>
+        <p:cTn id="1" dur="indefinite" restart="never" nodeType="tmRoot"/>
+      </p:par>
+    </p:tnLst>
+  </p:timing>
+</p:sld>
+</file>
+
+<file path=ppt/slides/slide21.xml><?xml version="1.0" encoding="utf-8"?>
+<p:sld xmlns:a="http://schemas.openxmlformats.org/drawingml/2006/main" xmlns:r="http://schemas.openxmlformats.org/officeDocument/2006/relationships" xmlns:p="http://schemas.openxmlformats.org/presentationml/2006/main">
+  <p:cSld>
+    <p:spTree>
+      <p:nvGrpSpPr>
+        <p:cNvPr id="1" name=""/>
+        <p:cNvGrpSpPr/>
+        <p:nvPr/>
+      </p:nvGrpSpPr>
+      <p:grpSpPr>
+        <a:xfrm>
+          <a:off x="0" y="0"/>
+          <a:ext cx="0" cy="0"/>
+          <a:chOff x="0" y="0"/>
+          <a:chExt cx="0" cy="0"/>
+        </a:xfrm>
+      </p:grpSpPr>
+      <p:sp>
+        <p:nvSpPr>
+          <p:cNvPr id="2" name="Title 1"/>
+          <p:cNvSpPr>
+            <a:spLocks noGrp="1"/>
+          </p:cNvSpPr>
+          <p:nvPr>
+            <p:ph type="title"/>
+          </p:nvPr>
+        </p:nvSpPr>
+        <p:spPr/>
+        <p:txBody>
+          <a:bodyPr/>
+          <a:lstStyle/>
+          <a:p>
+            <a:endParaRPr lang="en-US"/>
+          </a:p>
+        </p:txBody>
+      </p:sp>
+      <p:sp>
+        <p:nvSpPr>
+          <p:cNvPr id="3" name="Content Placeholder 2"/>
+          <p:cNvSpPr>
+            <a:spLocks noGrp="1"/>
+          </p:cNvSpPr>
+          <p:nvPr>
+            <p:ph idx="1"/>
+          </p:nvPr>
+        </p:nvSpPr>
+        <p:spPr/>
+        <p:txBody>
+          <a:bodyPr/>
+          <a:lstStyle/>
+          <a:p>
+            <a:endParaRPr lang="en-US"/>
+          </a:p>
+        </p:txBody>
+      </p:sp>
+      <p:sp>
+        <p:nvSpPr>
+          <p:cNvPr id="4" name="Slide Number Placeholder 3"/>
+          <p:cNvSpPr>
+            <a:spLocks noGrp="1"/>
+          </p:cNvSpPr>
+          <p:nvPr>
+            <p:ph type="sldNum" sz="quarter" idx="12"/>
+          </p:nvPr>
+        </p:nvSpPr>
+        <p:spPr/>
+        <p:txBody>
+          <a:bodyPr/>
+          <a:lstStyle/>
+          <a:p>
+            <a:fld id="{4006A555-BC29-4783-AB8D-804806BE464C}" type="slidenum">
+              <a:rPr lang="en-US" smtClean="0"/>
+              <a:pPr/>
+              <a:t>21</a:t>
+            </a:fld>
+            <a:endParaRPr lang="en-US"/>
+          </a:p>
+        </p:txBody>
+      </p:sp>
+      <p:pic>
+        <p:nvPicPr>
+          <p:cNvPr id="11266" name="Picture 2"/>
+          <p:cNvPicPr>
+            <a:picLocks noChangeAspect="1" noChangeArrowheads="1"/>
+          </p:cNvPicPr>
+          <p:nvPr/>
+        </p:nvPicPr>
+        <p:blipFill>
+          <a:blip r:embed="rId2"/>
+          <a:srcRect/>
+          <a:stretch>
+            <a:fillRect/>
+          </a:stretch>
+        </p:blipFill>
+        <p:spPr bwMode="auto">
+          <a:xfrm>
+            <a:off x="571500" y="871538"/>
+            <a:ext cx="8001000" cy="5114925"/>
+          </a:xfrm>
+          <a:prstGeom prst="rect">
+            <a:avLst/>
+          </a:prstGeom>
+          <a:noFill/>
+          <a:ln w="9525">
+            <a:noFill/>
+            <a:miter lim="800000"/>
+            <a:headEnd/>
+            <a:tailEnd/>
+          </a:ln>
+          <a:effectLst/>
+        </p:spPr>
+      </p:pic>
+    </p:spTree>
+  </p:cSld>
+  <p:clrMapOvr>
+    <a:masterClrMapping/>
+  </p:clrMapOvr>
+  <p:timing>
+    <p:tnLst>
+      <p:par>
+        <p:cTn id="1" dur="indefinite" restart="never" nodeType="tmRoot"/>
+      </p:par>
+    </p:tnLst>
+  </p:timing>
+</p:sld>
+</file>
+
+<file path=ppt/slides/slide22.xml><?xml version="1.0" encoding="utf-8"?>
+<p:sld xmlns:a="http://schemas.openxmlformats.org/drawingml/2006/main" xmlns:r="http://schemas.openxmlformats.org/officeDocument/2006/relationships" xmlns:p="http://schemas.openxmlformats.org/presentationml/2006/main">
+  <p:cSld>
+    <p:spTree>
+      <p:nvGrpSpPr>
+        <p:cNvPr id="1" name=""/>
+        <p:cNvGrpSpPr/>
+        <p:nvPr/>
+      </p:nvGrpSpPr>
+      <p:grpSpPr>
+        <a:xfrm>
+          <a:off x="0" y="0"/>
+          <a:ext cx="0" cy="0"/>
+          <a:chOff x="0" y="0"/>
+          <a:chExt cx="0" cy="0"/>
+        </a:xfrm>
+      </p:grpSpPr>
+      <p:sp>
+        <p:nvSpPr>
+          <p:cNvPr id="2" name="Title 1"/>
+          <p:cNvSpPr>
+            <a:spLocks noGrp="1"/>
+          </p:cNvSpPr>
+          <p:nvPr>
+            <p:ph type="title"/>
+          </p:nvPr>
+        </p:nvSpPr>
+        <p:spPr/>
+        <p:txBody>
+          <a:bodyPr/>
+          <a:lstStyle/>
+          <a:p>
+            <a:endParaRPr lang="en-US"/>
+          </a:p>
+        </p:txBody>
+      </p:sp>
+      <p:sp>
+        <p:nvSpPr>
+          <p:cNvPr id="3" name="Content Placeholder 2"/>
+          <p:cNvSpPr>
+            <a:spLocks noGrp="1"/>
+          </p:cNvSpPr>
+          <p:nvPr>
+            <p:ph idx="1"/>
+          </p:nvPr>
+        </p:nvSpPr>
+        <p:spPr/>
+        <p:txBody>
+          <a:bodyPr/>
+          <a:lstStyle/>
+          <a:p>
+            <a:endParaRPr lang="en-US"/>
+          </a:p>
+        </p:txBody>
+      </p:sp>
+      <p:sp>
+        <p:nvSpPr>
+          <p:cNvPr id="4" name="Slide Number Placeholder 3"/>
+          <p:cNvSpPr>
+            <a:spLocks noGrp="1"/>
+          </p:cNvSpPr>
+          <p:nvPr>
+            <p:ph type="sldNum" sz="quarter" idx="12"/>
+          </p:nvPr>
+        </p:nvSpPr>
+        <p:spPr/>
+        <p:txBody>
+          <a:bodyPr/>
+          <a:lstStyle/>
+          <a:p>
+            <a:fld id="{4006A555-BC29-4783-AB8D-804806BE464C}" type="slidenum">
+              <a:rPr lang="en-US" smtClean="0"/>
+              <a:pPr/>
+              <a:t>22</a:t>
+            </a:fld>
+            <a:endParaRPr lang="en-US"/>
+          </a:p>
+        </p:txBody>
+      </p:sp>
+      <p:pic>
+        <p:nvPicPr>
+          <p:cNvPr id="12290" name="Picture 2"/>
+          <p:cNvPicPr>
+            <a:picLocks noChangeAspect="1" noChangeArrowheads="1"/>
+          </p:cNvPicPr>
+          <p:nvPr/>
+        </p:nvPicPr>
+        <p:blipFill>
+          <a:blip r:embed="rId2"/>
+          <a:srcRect/>
+          <a:stretch>
+            <a:fillRect/>
+          </a:stretch>
+        </p:blipFill>
+        <p:spPr bwMode="auto">
+          <a:xfrm>
+            <a:off x="638175" y="904875"/>
+            <a:ext cx="7867650" cy="5048250"/>
+          </a:xfrm>
+          <a:prstGeom prst="rect">
+            <a:avLst/>
+          </a:prstGeom>
+          <a:noFill/>
+          <a:ln w="9525">
+            <a:noFill/>
+            <a:miter lim="800000"/>
+            <a:headEnd/>
+            <a:tailEnd/>
+          </a:ln>
+          <a:effectLst/>
+        </p:spPr>
+      </p:pic>
+    </p:spTree>
+  </p:cSld>
+  <p:clrMapOvr>
+    <a:masterClrMapping/>
+  </p:clrMapOvr>
+  <p:timing>
+    <p:tnLst>
+      <p:par>
+        <p:cTn id="1" dur="indefinite" restart="never" nodeType="tmRoot"/>
+      </p:par>
+    </p:tnLst>
+  </p:timing>
+</p:sld>
+</file>
+
+<file path=ppt/slides/slide23.xml><?xml version="1.0" encoding="utf-8"?>
+<p:sld xmlns:a="http://schemas.openxmlformats.org/drawingml/2006/main" xmlns:r="http://schemas.openxmlformats.org/officeDocument/2006/relationships" xmlns:p="http://schemas.openxmlformats.org/presentationml/2006/main">
+  <p:cSld>
+    <p:spTree>
+      <p:nvGrpSpPr>
+        <p:cNvPr id="1" name=""/>
+        <p:cNvGrpSpPr/>
+        <p:nvPr/>
+      </p:nvGrpSpPr>
+      <p:grpSpPr>
+        <a:xfrm>
+          <a:off x="0" y="0"/>
+          <a:ext cx="0" cy="0"/>
+          <a:chOff x="0" y="0"/>
+          <a:chExt cx="0" cy="0"/>
+        </a:xfrm>
+      </p:grpSpPr>
+      <p:sp>
+        <p:nvSpPr>
+          <p:cNvPr id="2" name="Title 1"/>
+          <p:cNvSpPr>
+            <a:spLocks noGrp="1"/>
+          </p:cNvSpPr>
+          <p:nvPr>
+            <p:ph type="title"/>
+          </p:nvPr>
+        </p:nvSpPr>
+        <p:spPr/>
+        <p:txBody>
+          <a:bodyPr/>
+          <a:lstStyle/>
+          <a:p>
+            <a:endParaRPr lang="en-US"/>
+          </a:p>
+        </p:txBody>
+      </p:sp>
+      <p:sp>
+        <p:nvSpPr>
+          <p:cNvPr id="3" name="Content Placeholder 2"/>
+          <p:cNvSpPr>
+            <a:spLocks noGrp="1"/>
+          </p:cNvSpPr>
+          <p:nvPr>
+            <p:ph idx="1"/>
+          </p:nvPr>
+        </p:nvSpPr>
+        <p:spPr/>
+        <p:txBody>
+          <a:bodyPr/>
+          <a:lstStyle/>
+          <a:p>
+            <a:endParaRPr lang="en-US"/>
+          </a:p>
+        </p:txBody>
+      </p:sp>
+      <p:sp>
+        <p:nvSpPr>
+          <p:cNvPr id="4" name="Slide Number Placeholder 3"/>
+          <p:cNvSpPr>
+            <a:spLocks noGrp="1"/>
+          </p:cNvSpPr>
+          <p:nvPr>
+            <p:ph type="sldNum" sz="quarter" idx="12"/>
+          </p:nvPr>
+        </p:nvSpPr>
+        <p:spPr/>
+        <p:txBody>
+          <a:bodyPr/>
+          <a:lstStyle/>
+          <a:p>
+            <a:fld id="{4006A555-BC29-4783-AB8D-804806BE464C}" type="slidenum">
+              <a:rPr lang="en-US" smtClean="0"/>
+              <a:pPr/>
+              <a:t>23</a:t>
+            </a:fld>
+            <a:endParaRPr lang="en-US"/>
+          </a:p>
+        </p:txBody>
+      </p:sp>
+      <p:pic>
+        <p:nvPicPr>
+          <p:cNvPr id="13314" name="Picture 2"/>
+          <p:cNvPicPr>
+            <a:picLocks noChangeAspect="1" noChangeArrowheads="1"/>
+          </p:cNvPicPr>
+          <p:nvPr/>
+        </p:nvPicPr>
+        <p:blipFill>
+          <a:blip r:embed="rId2"/>
+          <a:srcRect/>
+          <a:stretch>
+            <a:fillRect/>
+          </a:stretch>
+        </p:blipFill>
+        <p:spPr bwMode="auto">
+          <a:xfrm>
+            <a:off x="614363" y="1085850"/>
+            <a:ext cx="7915275" cy="4686300"/>
+          </a:xfrm>
+          <a:prstGeom prst="rect">
+            <a:avLst/>
+          </a:prstGeom>
+          <a:noFill/>
+          <a:ln w="9525">
+            <a:noFill/>
+            <a:miter lim="800000"/>
+            <a:headEnd/>
+            <a:tailEnd/>
+          </a:ln>
+          <a:effectLst/>
+        </p:spPr>
+      </p:pic>
+    </p:spTree>
+  </p:cSld>
+  <p:clrMapOvr>
+    <a:masterClrMapping/>
+  </p:clrMapOvr>
+  <p:timing>
+    <p:tnLst>
+      <p:par>
+        <p:cTn id="1" dur="indefinite" restart="never" nodeType="tmRoot"/>
+      </p:par>
+    </p:tnLst>
+  </p:timing>
+</p:sld>
+</file>
+
+<file path=ppt/slides/slide24.xml><?xml version="1.0" encoding="utf-8"?>
+<p:sld xmlns:a="http://schemas.openxmlformats.org/drawingml/2006/main" xmlns:r="http://schemas.openxmlformats.org/officeDocument/2006/relationships" xmlns:p="http://schemas.openxmlformats.org/presentationml/2006/main">
+  <p:cSld>
+    <p:spTree>
+      <p:nvGrpSpPr>
+        <p:cNvPr id="1" name=""/>
+        <p:cNvGrpSpPr/>
+        <p:nvPr/>
+      </p:nvGrpSpPr>
+      <p:grpSpPr>
+        <a:xfrm>
+          <a:off x="0" y="0"/>
+          <a:ext cx="0" cy="0"/>
+          <a:chOff x="0" y="0"/>
+          <a:chExt cx="0" cy="0"/>
+        </a:xfrm>
+      </p:grpSpPr>
+      <p:sp>
+        <p:nvSpPr>
+          <p:cNvPr id="2" name="Title 1"/>
+          <p:cNvSpPr>
+            <a:spLocks noGrp="1"/>
+          </p:cNvSpPr>
+          <p:nvPr>
+            <p:ph type="title"/>
+          </p:nvPr>
+        </p:nvSpPr>
+        <p:spPr/>
+        <p:txBody>
+          <a:bodyPr/>
+          <a:lstStyle/>
+          <a:p>
+            <a:endParaRPr lang="en-US"/>
+          </a:p>
+        </p:txBody>
+      </p:sp>
+      <p:sp>
+        <p:nvSpPr>
+          <p:cNvPr id="3" name="Content Placeholder 2"/>
+          <p:cNvSpPr>
+            <a:spLocks noGrp="1"/>
+          </p:cNvSpPr>
+          <p:nvPr>
+            <p:ph idx="1"/>
+          </p:nvPr>
+        </p:nvSpPr>
+        <p:spPr/>
+        <p:txBody>
+          <a:bodyPr/>
+          <a:lstStyle/>
+          <a:p>
+            <a:endParaRPr lang="en-US"/>
+          </a:p>
+        </p:txBody>
+      </p:sp>
+      <p:sp>
+        <p:nvSpPr>
+          <p:cNvPr id="4" name="Slide Number Placeholder 3"/>
+          <p:cNvSpPr>
+            <a:spLocks noGrp="1"/>
+          </p:cNvSpPr>
+          <p:nvPr>
+            <p:ph type="sldNum" sz="quarter" idx="12"/>
+          </p:nvPr>
+        </p:nvSpPr>
+        <p:spPr/>
+        <p:txBody>
+          <a:bodyPr/>
+          <a:lstStyle/>
+          <a:p>
+            <a:fld id="{4006A555-BC29-4783-AB8D-804806BE464C}" type="slidenum">
+              <a:rPr lang="en-US" smtClean="0"/>
+              <a:pPr/>
+              <a:t>24</a:t>
+            </a:fld>
+            <a:endParaRPr lang="en-US"/>
+          </a:p>
+        </p:txBody>
+      </p:sp>
+      <p:pic>
+        <p:nvPicPr>
+          <p:cNvPr id="14338" name="Picture 2"/>
+          <p:cNvPicPr>
+            <a:picLocks noChangeAspect="1" noChangeArrowheads="1"/>
+          </p:cNvPicPr>
+          <p:nvPr/>
+        </p:nvPicPr>
+        <p:blipFill>
+          <a:blip r:embed="rId2"/>
+          <a:srcRect/>
+          <a:stretch>
+            <a:fillRect/>
+          </a:stretch>
+        </p:blipFill>
+        <p:spPr bwMode="auto">
+          <a:xfrm>
+            <a:off x="914400" y="1295400"/>
+            <a:ext cx="7799223" cy="4790677"/>
+          </a:xfrm>
+          <a:prstGeom prst="rect">
+            <a:avLst/>
+          </a:prstGeom>
+          <a:noFill/>
+          <a:ln w="9525">
+            <a:noFill/>
+            <a:miter lim="800000"/>
+            <a:headEnd/>
+            <a:tailEnd/>
+          </a:ln>
+          <a:effectLst/>
+        </p:spPr>
+      </p:pic>
+    </p:spTree>
+  </p:cSld>
+  <p:clrMapOvr>
+    <a:masterClrMapping/>
+  </p:clrMapOvr>
+  <p:timing>
+    <p:tnLst>
+      <p:par>
+        <p:cTn id="1" dur="indefinite" restart="never" nodeType="tmRoot"/>
+      </p:par>
+    </p:tnLst>
+  </p:timing>
+</p:sld>
+</file>
+
+<file path=ppt/slides/slide25.xml><?xml version="1.0" encoding="utf-8"?>
+<p:sld xmlns:a="http://schemas.openxmlformats.org/drawingml/2006/main" xmlns:r="http://schemas.openxmlformats.org/officeDocument/2006/relationships" xmlns:p="http://schemas.openxmlformats.org/presentationml/2006/main">
+  <p:cSld>
+    <p:spTree>
+      <p:nvGrpSpPr>
+        <p:cNvPr id="1" name=""/>
+        <p:cNvGrpSpPr/>
+        <p:nvPr/>
+      </p:nvGrpSpPr>
+      <p:grpSpPr>
+        <a:xfrm>
+          <a:off x="0" y="0"/>
+          <a:ext cx="0" cy="0"/>
+          <a:chOff x="0" y="0"/>
+          <a:chExt cx="0" cy="0"/>
+        </a:xfrm>
+      </p:grpSpPr>
+      <p:sp>
+        <p:nvSpPr>
+          <p:cNvPr id="2" name="Title 1"/>
+          <p:cNvSpPr>
+            <a:spLocks noGrp="1"/>
+          </p:cNvSpPr>
+          <p:nvPr>
+            <p:ph type="title"/>
+          </p:nvPr>
+        </p:nvSpPr>
+        <p:spPr/>
+        <p:txBody>
+          <a:bodyPr/>
+          <a:lstStyle/>
+          <a:p>
+            <a:endParaRPr lang="en-US"/>
+          </a:p>
+        </p:txBody>
+      </p:sp>
+      <p:sp>
+        <p:nvSpPr>
+          <p:cNvPr id="3" name="Content Placeholder 2"/>
+          <p:cNvSpPr>
+            <a:spLocks noGrp="1"/>
+          </p:cNvSpPr>
+          <p:nvPr>
+            <p:ph idx="1"/>
+          </p:nvPr>
+        </p:nvSpPr>
+        <p:spPr/>
+        <p:txBody>
+          <a:bodyPr/>
+          <a:lstStyle/>
+          <a:p>
+            <a:endParaRPr lang="en-US"/>
+          </a:p>
+        </p:txBody>
+      </p:sp>
+      <p:sp>
+        <p:nvSpPr>
+          <p:cNvPr id="4" name="Slide Number Placeholder 3"/>
+          <p:cNvSpPr>
+            <a:spLocks noGrp="1"/>
+          </p:cNvSpPr>
+          <p:nvPr>
+            <p:ph type="sldNum" sz="quarter" idx="12"/>
+          </p:nvPr>
+        </p:nvSpPr>
+        <p:spPr/>
+        <p:txBody>
+          <a:bodyPr/>
+          <a:lstStyle/>
+          <a:p>
+            <a:fld id="{4006A555-BC29-4783-AB8D-804806BE464C}" type="slidenum">
+              <a:rPr lang="en-US" smtClean="0"/>
+              <a:pPr/>
+              <a:t>25</a:t>
+            </a:fld>
+            <a:endParaRPr lang="en-US"/>
+          </a:p>
+        </p:txBody>
+      </p:sp>
+      <p:pic>
+        <p:nvPicPr>
+          <p:cNvPr id="15362" name="Picture 2"/>
+          <p:cNvPicPr>
+            <a:picLocks noChangeAspect="1" noChangeArrowheads="1"/>
+          </p:cNvPicPr>
+          <p:nvPr/>
+        </p:nvPicPr>
+        <p:blipFill>
+          <a:blip r:embed="rId2"/>
+          <a:srcRect/>
+          <a:stretch>
+            <a:fillRect/>
+          </a:stretch>
+        </p:blipFill>
+        <p:spPr bwMode="auto">
+          <a:xfrm>
+            <a:off x="766763" y="990600"/>
+            <a:ext cx="7610475" cy="4876800"/>
+          </a:xfrm>
+          <a:prstGeom prst="rect">
+            <a:avLst/>
+          </a:prstGeom>
+          <a:noFill/>
+          <a:ln w="9525">
+            <a:noFill/>
+            <a:miter lim="800000"/>
+            <a:headEnd/>
+            <a:tailEnd/>
+          </a:ln>
+          <a:effectLst/>
+        </p:spPr>
+      </p:pic>
+    </p:spTree>
+  </p:cSld>
+  <p:clrMapOvr>
+    <a:masterClrMapping/>
+  </p:clrMapOvr>
+  <p:timing>
+    <p:tnLst>
+      <p:par>
+        <p:cTn id="1" dur="indefinite" restart="never" nodeType="tmRoot"/>
+      </p:par>
+    </p:tnLst>
+  </p:timing>
+</p:sld>
+</file>
+
+<file path=ppt/slides/slide26.xml><?xml version="1.0" encoding="utf-8"?>
+<p:sld xmlns:a="http://schemas.openxmlformats.org/drawingml/2006/main" xmlns:r="http://schemas.openxmlformats.org/officeDocument/2006/relationships" xmlns:p="http://schemas.openxmlformats.org/presentationml/2006/main">
+  <p:cSld>
+    <p:spTree>
+      <p:nvGrpSpPr>
+        <p:cNvPr id="1" name=""/>
+        <p:cNvGrpSpPr/>
+        <p:nvPr/>
+      </p:nvGrpSpPr>
+      <p:grpSpPr>
+        <a:xfrm>
+          <a:off x="0" y="0"/>
+          <a:ext cx="0" cy="0"/>
+          <a:chOff x="0" y="0"/>
+          <a:chExt cx="0" cy="0"/>
+        </a:xfrm>
+      </p:grpSpPr>
+      <p:sp>
+        <p:nvSpPr>
+          <p:cNvPr id="2" name="Title 1"/>
+          <p:cNvSpPr>
+            <a:spLocks noGrp="1"/>
+          </p:cNvSpPr>
+          <p:nvPr>
+            <p:ph type="title"/>
+          </p:nvPr>
+        </p:nvSpPr>
+        <p:spPr/>
+        <p:txBody>
+          <a:bodyPr/>
+          <a:lstStyle/>
+          <a:p>
+            <a:endParaRPr lang="en-US"/>
+          </a:p>
+        </p:txBody>
+      </p:sp>
+      <p:sp>
+        <p:nvSpPr>
+          <p:cNvPr id="3" name="Content Placeholder 2"/>
+          <p:cNvSpPr>
+            <a:spLocks noGrp="1"/>
+          </p:cNvSpPr>
+          <p:nvPr>
+            <p:ph idx="1"/>
+          </p:nvPr>
+        </p:nvSpPr>
+        <p:spPr/>
+        <p:txBody>
+          <a:bodyPr/>
+          <a:lstStyle/>
+          <a:p>
+            <a:endParaRPr lang="en-US"/>
+          </a:p>
+        </p:txBody>
+      </p:sp>
+      <p:sp>
+        <p:nvSpPr>
+          <p:cNvPr id="4" name="Slide Number Placeholder 3"/>
+          <p:cNvSpPr>
+            <a:spLocks noGrp="1"/>
+          </p:cNvSpPr>
+          <p:nvPr>
+            <p:ph type="sldNum" sz="quarter" idx="12"/>
+          </p:nvPr>
+        </p:nvSpPr>
+        <p:spPr/>
+        <p:txBody>
+          <a:bodyPr/>
+          <a:lstStyle/>
+          <a:p>
+            <a:fld id="{4006A555-BC29-4783-AB8D-804806BE464C}" type="slidenum">
+              <a:rPr lang="en-US" smtClean="0"/>
+              <a:pPr/>
+              <a:t>26</a:t>
+            </a:fld>
+            <a:endParaRPr lang="en-US"/>
+          </a:p>
+        </p:txBody>
+      </p:sp>
+      <p:pic>
+        <p:nvPicPr>
+          <p:cNvPr id="16386" name="Picture 2"/>
+          <p:cNvPicPr>
+            <a:picLocks noChangeAspect="1" noChangeArrowheads="1"/>
+          </p:cNvPicPr>
+          <p:nvPr/>
+        </p:nvPicPr>
+        <p:blipFill>
+          <a:blip r:embed="rId2"/>
+          <a:srcRect/>
+          <a:stretch>
+            <a:fillRect/>
+          </a:stretch>
+        </p:blipFill>
+        <p:spPr bwMode="auto">
+          <a:xfrm>
+            <a:off x="728663" y="938213"/>
+            <a:ext cx="7686675" cy="4981575"/>
+          </a:xfrm>
+          <a:prstGeom prst="rect">
+            <a:avLst/>
+          </a:prstGeom>
+          <a:noFill/>
+          <a:ln w="9525">
+            <a:noFill/>
+            <a:miter lim="800000"/>
+            <a:headEnd/>
+            <a:tailEnd/>
+          </a:ln>
+          <a:effectLst/>
+        </p:spPr>
+      </p:pic>
     </p:spTree>
   </p:cSld>
   <p:clrMapOvr>
@@ -3710,6 +6066,7 @@
           <a:p>
             <a:fld id="{4006A555-BC29-4783-AB8D-804806BE464C}" type="slidenum">
               <a:rPr lang="en-US" smtClean="0"/>
+              <a:pPr/>
               <a:t>3</a:t>
             </a:fld>
             <a:endParaRPr lang="en-US"/>
@@ -3836,6 +6193,7 @@
           <a:p>
             <a:fld id="{4006A555-BC29-4783-AB8D-804806BE464C}" type="slidenum">
               <a:rPr lang="en-US" smtClean="0"/>
+              <a:pPr/>
               <a:t>4</a:t>
             </a:fld>
             <a:endParaRPr lang="en-US"/>
@@ -3955,6 +6313,7 @@
           <a:p>
             <a:fld id="{4006A555-BC29-4783-AB8D-804806BE464C}" type="slidenum">
               <a:rPr lang="en-US" smtClean="0"/>
+              <a:pPr/>
               <a:t>5</a:t>
             </a:fld>
             <a:endParaRPr lang="en-US"/>
@@ -4074,6 +6433,7 @@
           <a:p>
             <a:fld id="{4006A555-BC29-4783-AB8D-804806BE464C}" type="slidenum">
               <a:rPr lang="en-US" smtClean="0"/>
+              <a:pPr/>
               <a:t>6</a:t>
             </a:fld>
             <a:endParaRPr lang="en-US"/>
@@ -4193,6 +6553,7 @@
           <a:p>
             <a:fld id="{4006A555-BC29-4783-AB8D-804806BE464C}" type="slidenum">
               <a:rPr lang="en-US" smtClean="0"/>
+              <a:pPr/>
               <a:t>7</a:t>
             </a:fld>
             <a:endParaRPr lang="en-US"/>
@@ -4312,6 +6673,7 @@
           <a:p>
             <a:fld id="{4006A555-BC29-4783-AB8D-804806BE464C}" type="slidenum">
               <a:rPr lang="en-US" smtClean="0"/>
+              <a:pPr/>
               <a:t>8</a:t>
             </a:fld>
             <a:endParaRPr lang="en-US"/>
@@ -4356,6 +6718,133 @@
   <p:clrMapOvr>
     <a:masterClrMapping/>
   </p:clrMapOvr>
+</p:sld>
+</file>
+
+<file path=ppt/slides/slide9.xml><?xml version="1.0" encoding="utf-8"?>
+<p:sld xmlns:a="http://schemas.openxmlformats.org/drawingml/2006/main" xmlns:r="http://schemas.openxmlformats.org/officeDocument/2006/relationships" xmlns:p="http://schemas.openxmlformats.org/presentationml/2006/main">
+  <p:cSld>
+    <p:spTree>
+      <p:nvGrpSpPr>
+        <p:cNvPr id="1" name=""/>
+        <p:cNvGrpSpPr/>
+        <p:nvPr/>
+      </p:nvGrpSpPr>
+      <p:grpSpPr>
+        <a:xfrm>
+          <a:off x="0" y="0"/>
+          <a:ext cx="0" cy="0"/>
+          <a:chOff x="0" y="0"/>
+          <a:chExt cx="0" cy="0"/>
+        </a:xfrm>
+      </p:grpSpPr>
+      <p:sp>
+        <p:nvSpPr>
+          <p:cNvPr id="2" name="Title 1"/>
+          <p:cNvSpPr>
+            <a:spLocks noGrp="1"/>
+          </p:cNvSpPr>
+          <p:nvPr>
+            <p:ph type="title"/>
+          </p:nvPr>
+        </p:nvSpPr>
+        <p:spPr/>
+        <p:txBody>
+          <a:bodyPr/>
+          <a:lstStyle/>
+          <a:p>
+            <a:endParaRPr lang="en-US"/>
+          </a:p>
+        </p:txBody>
+      </p:sp>
+      <p:sp>
+        <p:nvSpPr>
+          <p:cNvPr id="3" name="Content Placeholder 2"/>
+          <p:cNvSpPr>
+            <a:spLocks noGrp="1"/>
+          </p:cNvSpPr>
+          <p:nvPr>
+            <p:ph idx="1"/>
+          </p:nvPr>
+        </p:nvSpPr>
+        <p:spPr/>
+        <p:txBody>
+          <a:bodyPr/>
+          <a:lstStyle/>
+          <a:p>
+            <a:endParaRPr lang="en-US"/>
+          </a:p>
+        </p:txBody>
+      </p:sp>
+      <p:sp>
+        <p:nvSpPr>
+          <p:cNvPr id="4" name="Slide Number Placeholder 3"/>
+          <p:cNvSpPr>
+            <a:spLocks noGrp="1"/>
+          </p:cNvSpPr>
+          <p:nvPr>
+            <p:ph type="sldNum" sz="quarter" idx="12"/>
+          </p:nvPr>
+        </p:nvSpPr>
+        <p:spPr/>
+        <p:txBody>
+          <a:bodyPr/>
+          <a:lstStyle/>
+          <a:p>
+            <a:fld id="{4006A555-BC29-4783-AB8D-804806BE464C}" type="slidenum">
+              <a:rPr lang="en-US" smtClean="0"/>
+              <a:pPr/>
+              <a:t>9</a:t>
+            </a:fld>
+            <a:endParaRPr lang="en-US"/>
+          </a:p>
+        </p:txBody>
+      </p:sp>
+      <p:pic>
+        <p:nvPicPr>
+          <p:cNvPr id="1026" name="Picture 2"/>
+          <p:cNvPicPr>
+            <a:picLocks noChangeAspect="1" noChangeArrowheads="1"/>
+          </p:cNvPicPr>
+          <p:nvPr/>
+        </p:nvPicPr>
+        <p:blipFill>
+          <a:blip r:embed="rId2"/>
+          <a:srcRect/>
+          <a:stretch>
+            <a:fillRect/>
+          </a:stretch>
+        </p:blipFill>
+        <p:spPr bwMode="auto">
+          <a:xfrm>
+            <a:off x="676275" y="900113"/>
+            <a:ext cx="7791450" cy="5057775"/>
+          </a:xfrm>
+          <a:prstGeom prst="rect">
+            <a:avLst/>
+          </a:prstGeom>
+          <a:noFill/>
+          <a:ln w="9525">
+            <a:noFill/>
+            <a:miter lim="800000"/>
+            <a:headEnd/>
+            <a:tailEnd/>
+          </a:ln>
+          <a:effectLst/>
+        </p:spPr>
+      </p:pic>
+    </p:spTree>
+  </p:cSld>
+  <p:clrMapOvr>
+    <a:masterClrMapping/>
+  </p:clrMapOvr>
+  <p:timing>
+    <p:tnLst>
+      <p:par>
+        <p:cTn id="1" dur="indefinite" restart="never" nodeType="tmRoot"/>
+      </p:par>
+    </p:tnLst>
+  </p:timing>
 </p:sld>
 </file>
 

</xml_diff>